<commit_message>
update overview and added shell solution
</commit_message>
<xml_diff>
--- a/overview.pptx
+++ b/overview.pptx
@@ -6,6 +6,8 @@
   </p:sldMasterIdLst>
   <p:sldIdLst>
     <p:sldId id="256" r:id="rId2"/>
+    <p:sldId id="257" r:id="rId3"/>
+    <p:sldId id="258" r:id="rId4"/>
   </p:sldIdLst>
   <p:sldSz cx="12192000" cy="6858000"/>
   <p:notesSz cx="6858000" cy="9144000"/>
@@ -104,6 +106,11 @@
       </a:defRPr>
     </a:lvl9pPr>
   </p:defaultTextStyle>
+  <p:extLst>
+    <p:ext uri="{EFAFB233-063F-42B5-8137-9DF3F51BA10A}">
+      <p15:sldGuideLst xmlns:p15="http://schemas.microsoft.com/office/powerpoint/2012/main"/>
+    </p:ext>
+  </p:extLst>
 </p:presentation>
 </file>
 
@@ -152,7 +159,6 @@
               <a:rPr lang="en-US"/>
               <a:t>Click to edit Master title style</a:t>
             </a:r>
-            <a:endParaRPr lang="en-US"/>
           </a:p>
         </p:txBody>
       </p:sp>
@@ -217,7 +223,6 @@
               <a:rPr lang="en-US"/>
               <a:t>Click to edit Master subtitle style</a:t>
             </a:r>
-            <a:endParaRPr lang="en-US"/>
           </a:p>
         </p:txBody>
       </p:sp>
@@ -238,7 +243,7 @@
           <a:p>
             <a:fld id="{49757FAF-5228-43FF-9B16-6D8B7CFFD72C}" type="datetimeFigureOut">
               <a:rPr lang="en-US" smtClean="0"/>
-              <a:t>5/9/2017</a:t>
+              <a:t>5/12/2017</a:t>
             </a:fld>
             <a:endParaRPr lang="en-US"/>
           </a:p>
@@ -335,7 +340,6 @@
               <a:rPr lang="en-US"/>
               <a:t>Click to edit Master title style</a:t>
             </a:r>
-            <a:endParaRPr lang="en-US"/>
           </a:p>
         </p:txBody>
       </p:sp>
@@ -387,7 +391,6 @@
               <a:rPr lang="en-US"/>
               <a:t>Fifth level</a:t>
             </a:r>
-            <a:endParaRPr lang="en-US"/>
           </a:p>
         </p:txBody>
       </p:sp>
@@ -408,7 +411,7 @@
           <a:p>
             <a:fld id="{49757FAF-5228-43FF-9B16-6D8B7CFFD72C}" type="datetimeFigureOut">
               <a:rPr lang="en-US" smtClean="0"/>
-              <a:t>5/9/2017</a:t>
+              <a:t>5/12/2017</a:t>
             </a:fld>
             <a:endParaRPr lang="en-US"/>
           </a:p>
@@ -510,7 +513,6 @@
               <a:rPr lang="en-US"/>
               <a:t>Click to edit Master title style</a:t>
             </a:r>
-            <a:endParaRPr lang="en-US"/>
           </a:p>
         </p:txBody>
       </p:sp>
@@ -567,7 +569,6 @@
               <a:rPr lang="en-US"/>
               <a:t>Fifth level</a:t>
             </a:r>
-            <a:endParaRPr lang="en-US"/>
           </a:p>
         </p:txBody>
       </p:sp>
@@ -588,7 +589,7 @@
           <a:p>
             <a:fld id="{49757FAF-5228-43FF-9B16-6D8B7CFFD72C}" type="datetimeFigureOut">
               <a:rPr lang="en-US" smtClean="0"/>
-              <a:t>5/9/2017</a:t>
+              <a:t>5/12/2017</a:t>
             </a:fld>
             <a:endParaRPr lang="en-US"/>
           </a:p>
@@ -685,7 +686,6 @@
               <a:rPr lang="en-US"/>
               <a:t>Click to edit Master title style</a:t>
             </a:r>
-            <a:endParaRPr lang="en-US"/>
           </a:p>
         </p:txBody>
       </p:sp>
@@ -737,7 +737,6 @@
               <a:rPr lang="en-US"/>
               <a:t>Fifth level</a:t>
             </a:r>
-            <a:endParaRPr lang="en-US"/>
           </a:p>
         </p:txBody>
       </p:sp>
@@ -758,7 +757,7 @@
           <a:p>
             <a:fld id="{49757FAF-5228-43FF-9B16-6D8B7CFFD72C}" type="datetimeFigureOut">
               <a:rPr lang="en-US" smtClean="0"/>
-              <a:t>5/9/2017</a:t>
+              <a:t>5/12/2017</a:t>
             </a:fld>
             <a:endParaRPr lang="en-US"/>
           </a:p>
@@ -864,7 +863,6 @@
               <a:rPr lang="en-US"/>
               <a:t>Click to edit Master title style</a:t>
             </a:r>
-            <a:endParaRPr lang="en-US"/>
           </a:p>
         </p:txBody>
       </p:sp>
@@ -1004,7 +1002,7 @@
           <a:p>
             <a:fld id="{49757FAF-5228-43FF-9B16-6D8B7CFFD72C}" type="datetimeFigureOut">
               <a:rPr lang="en-US" smtClean="0"/>
-              <a:t>5/9/2017</a:t>
+              <a:t>5/12/2017</a:t>
             </a:fld>
             <a:endParaRPr lang="en-US"/>
           </a:p>
@@ -1101,7 +1099,6 @@
               <a:rPr lang="en-US"/>
               <a:t>Click to edit Master title style</a:t>
             </a:r>
-            <a:endParaRPr lang="en-US"/>
           </a:p>
         </p:txBody>
       </p:sp>
@@ -1158,7 +1155,6 @@
               <a:rPr lang="en-US"/>
               <a:t>Fifth level</a:t>
             </a:r>
-            <a:endParaRPr lang="en-US"/>
           </a:p>
         </p:txBody>
       </p:sp>
@@ -1215,7 +1211,6 @@
               <a:rPr lang="en-US"/>
               <a:t>Fifth level</a:t>
             </a:r>
-            <a:endParaRPr lang="en-US"/>
           </a:p>
         </p:txBody>
       </p:sp>
@@ -1236,7 +1231,7 @@
           <a:p>
             <a:fld id="{49757FAF-5228-43FF-9B16-6D8B7CFFD72C}" type="datetimeFigureOut">
               <a:rPr lang="en-US" smtClean="0"/>
-              <a:t>5/9/2017</a:t>
+              <a:t>5/12/2017</a:t>
             </a:fld>
             <a:endParaRPr lang="en-US"/>
           </a:p>
@@ -1338,7 +1333,6 @@
               <a:rPr lang="en-US"/>
               <a:t>Click to edit Master title style</a:t>
             </a:r>
-            <a:endParaRPr lang="en-US"/>
           </a:p>
         </p:txBody>
       </p:sp>
@@ -1460,7 +1454,6 @@
               <a:rPr lang="en-US"/>
               <a:t>Fifth level</a:t>
             </a:r>
-            <a:endParaRPr lang="en-US"/>
           </a:p>
         </p:txBody>
       </p:sp>
@@ -1582,7 +1575,6 @@
               <a:rPr lang="en-US"/>
               <a:t>Fifth level</a:t>
             </a:r>
-            <a:endParaRPr lang="en-US"/>
           </a:p>
         </p:txBody>
       </p:sp>
@@ -1603,7 +1595,7 @@
           <a:p>
             <a:fld id="{49757FAF-5228-43FF-9B16-6D8B7CFFD72C}" type="datetimeFigureOut">
               <a:rPr lang="en-US" smtClean="0"/>
-              <a:t>5/9/2017</a:t>
+              <a:t>5/12/2017</a:t>
             </a:fld>
             <a:endParaRPr lang="en-US"/>
           </a:p>
@@ -1700,7 +1692,6 @@
               <a:rPr lang="en-US"/>
               <a:t>Click to edit Master title style</a:t>
             </a:r>
-            <a:endParaRPr lang="en-US"/>
           </a:p>
         </p:txBody>
       </p:sp>
@@ -1721,7 +1712,7 @@
           <a:p>
             <a:fld id="{49757FAF-5228-43FF-9B16-6D8B7CFFD72C}" type="datetimeFigureOut">
               <a:rPr lang="en-US" smtClean="0"/>
-              <a:t>5/9/2017</a:t>
+              <a:t>5/12/2017</a:t>
             </a:fld>
             <a:endParaRPr lang="en-US"/>
           </a:p>
@@ -1816,7 +1807,7 @@
           <a:p>
             <a:fld id="{49757FAF-5228-43FF-9B16-6D8B7CFFD72C}" type="datetimeFigureOut">
               <a:rPr lang="en-US" smtClean="0"/>
-              <a:t>5/9/2017</a:t>
+              <a:t>5/12/2017</a:t>
             </a:fld>
             <a:endParaRPr lang="en-US"/>
           </a:p>
@@ -1922,7 +1913,6 @@
               <a:rPr lang="en-US"/>
               <a:t>Click to edit Master title style</a:t>
             </a:r>
-            <a:endParaRPr lang="en-US"/>
           </a:p>
         </p:txBody>
       </p:sp>
@@ -2007,7 +1997,6 @@
               <a:rPr lang="en-US"/>
               <a:t>Fifth level</a:t>
             </a:r>
-            <a:endParaRPr lang="en-US"/>
           </a:p>
         </p:txBody>
       </p:sp>
@@ -2093,7 +2082,7 @@
           <a:p>
             <a:fld id="{49757FAF-5228-43FF-9B16-6D8B7CFFD72C}" type="datetimeFigureOut">
               <a:rPr lang="en-US" smtClean="0"/>
-              <a:t>5/9/2017</a:t>
+              <a:t>5/12/2017</a:t>
             </a:fld>
             <a:endParaRPr lang="en-US"/>
           </a:p>
@@ -2199,7 +2188,6 @@
               <a:rPr lang="en-US"/>
               <a:t>Click to edit Master title style</a:t>
             </a:r>
-            <a:endParaRPr lang="en-US"/>
           </a:p>
         </p:txBody>
       </p:sp>
@@ -2346,7 +2334,7 @@
           <a:p>
             <a:fld id="{49757FAF-5228-43FF-9B16-6D8B7CFFD72C}" type="datetimeFigureOut">
               <a:rPr lang="en-US" smtClean="0"/>
-              <a:t>5/9/2017</a:t>
+              <a:t>5/12/2017</a:t>
             </a:fld>
             <a:endParaRPr lang="en-US"/>
           </a:p>
@@ -2458,7 +2446,6 @@
               <a:rPr lang="en-US"/>
               <a:t>Click to edit Master title style</a:t>
             </a:r>
-            <a:endParaRPr lang="en-US"/>
           </a:p>
         </p:txBody>
       </p:sp>
@@ -2520,7 +2507,6 @@
               <a:rPr lang="en-US"/>
               <a:t>Fifth level</a:t>
             </a:r>
-            <a:endParaRPr lang="en-US"/>
           </a:p>
         </p:txBody>
       </p:sp>
@@ -2559,7 +2545,7 @@
           <a:p>
             <a:fld id="{49757FAF-5228-43FF-9B16-6D8B7CFFD72C}" type="datetimeFigureOut">
               <a:rPr lang="en-US" smtClean="0"/>
-              <a:t>5/9/2017</a:t>
+              <a:t>5/12/2017</a:t>
             </a:fld>
             <a:endParaRPr lang="en-US"/>
           </a:p>
@@ -3923,6 +3909,2415 @@
 </p:sld>
 </file>
 
+<file path=ppt/slides/slide2.xml><?xml version="1.0" encoding="utf-8"?>
+<p:sld xmlns:a="http://schemas.openxmlformats.org/drawingml/2006/main" xmlns:r="http://schemas.openxmlformats.org/officeDocument/2006/relationships" xmlns:p="http://schemas.openxmlformats.org/presentationml/2006/main">
+  <p:cSld>
+    <p:spTree>
+      <p:nvGrpSpPr>
+        <p:cNvPr id="1" name=""/>
+        <p:cNvGrpSpPr/>
+        <p:nvPr/>
+      </p:nvGrpSpPr>
+      <p:grpSpPr>
+        <a:xfrm>
+          <a:off x="0" y="0"/>
+          <a:ext cx="0" cy="0"/>
+          <a:chOff x="0" y="0"/>
+          <a:chExt cx="0" cy="0"/>
+        </a:xfrm>
+      </p:grpSpPr>
+      <p:sp>
+        <p:nvSpPr>
+          <p:cNvPr id="2" name="Title 1"/>
+          <p:cNvSpPr>
+            <a:spLocks noGrp="1"/>
+          </p:cNvSpPr>
+          <p:nvPr>
+            <p:ph type="title"/>
+          </p:nvPr>
+        </p:nvSpPr>
+        <p:spPr>
+          <a:xfrm>
+            <a:off x="838200" y="365126"/>
+            <a:ext cx="10515600" cy="530614"/>
+          </a:xfrm>
+        </p:spPr>
+        <p:txBody>
+          <a:bodyPr>
+            <a:normAutofit fontScale="90000"/>
+          </a:bodyPr>
+          <a:lstStyle/>
+          <a:p>
+            <a:r>
+              <a:rPr lang="en-US" dirty="0"/>
+              <a:t>Message Flow</a:t>
+            </a:r>
+          </a:p>
+        </p:txBody>
+      </p:sp>
+      <p:sp>
+        <p:nvSpPr>
+          <p:cNvPr id="4" name="Oval 3"/>
+          <p:cNvSpPr/>
+          <p:nvPr/>
+        </p:nvSpPr>
+        <p:spPr>
+          <a:xfrm>
+            <a:off x="111966" y="1275297"/>
+            <a:ext cx="1679511" cy="914400"/>
+          </a:xfrm>
+          <a:prstGeom prst="ellipse">
+            <a:avLst/>
+          </a:prstGeom>
+        </p:spPr>
+        <p:style>
+          <a:lnRef idx="2">
+            <a:schemeClr val="accent1">
+              <a:shade val="50000"/>
+            </a:schemeClr>
+          </a:lnRef>
+          <a:fillRef idx="1">
+            <a:schemeClr val="accent1"/>
+          </a:fillRef>
+          <a:effectRef idx="0">
+            <a:schemeClr val="accent1"/>
+          </a:effectRef>
+          <a:fontRef idx="minor">
+            <a:schemeClr val="lt1"/>
+          </a:fontRef>
+        </p:style>
+        <p:txBody>
+          <a:bodyPr rtlCol="0" anchor="ctr"/>
+          <a:lstStyle/>
+          <a:p>
+            <a:pPr algn="ctr"/>
+            <a:r>
+              <a:rPr lang="en-US" dirty="0"/>
+              <a:t>Publishing Client App</a:t>
+            </a:r>
+          </a:p>
+        </p:txBody>
+      </p:sp>
+      <p:sp>
+        <p:nvSpPr>
+          <p:cNvPr id="5" name="Rectangle 4"/>
+          <p:cNvSpPr/>
+          <p:nvPr/>
+        </p:nvSpPr>
+        <p:spPr>
+          <a:xfrm>
+            <a:off x="4286037" y="1479737"/>
+            <a:ext cx="1680693" cy="530180"/>
+          </a:xfrm>
+          <a:prstGeom prst="rect">
+            <a:avLst/>
+          </a:prstGeom>
+        </p:spPr>
+        <p:style>
+          <a:lnRef idx="2">
+            <a:schemeClr val="accent1">
+              <a:shade val="50000"/>
+            </a:schemeClr>
+          </a:lnRef>
+          <a:fillRef idx="1">
+            <a:schemeClr val="accent1"/>
+          </a:fillRef>
+          <a:effectRef idx="0">
+            <a:schemeClr val="accent1"/>
+          </a:effectRef>
+          <a:fontRef idx="minor">
+            <a:schemeClr val="lt1"/>
+          </a:fontRef>
+        </p:style>
+        <p:txBody>
+          <a:bodyPr rtlCol="0" anchor="ctr"/>
+          <a:lstStyle/>
+          <a:p>
+            <a:pPr algn="ctr"/>
+            <a:r>
+              <a:rPr lang="en-US" dirty="0"/>
+              <a:t>Request Router</a:t>
+            </a:r>
+          </a:p>
+        </p:txBody>
+      </p:sp>
+      <p:sp>
+        <p:nvSpPr>
+          <p:cNvPr id="6" name="Rectangle 5"/>
+          <p:cNvSpPr/>
+          <p:nvPr/>
+        </p:nvSpPr>
+        <p:spPr>
+          <a:xfrm>
+            <a:off x="7753739" y="3821995"/>
+            <a:ext cx="3704253" cy="530180"/>
+          </a:xfrm>
+          <a:prstGeom prst="rect">
+            <a:avLst/>
+          </a:prstGeom>
+        </p:spPr>
+        <p:style>
+          <a:lnRef idx="2">
+            <a:schemeClr val="accent1">
+              <a:shade val="50000"/>
+            </a:schemeClr>
+          </a:lnRef>
+          <a:fillRef idx="1">
+            <a:schemeClr val="accent1"/>
+          </a:fillRef>
+          <a:effectRef idx="0">
+            <a:schemeClr val="accent1"/>
+          </a:effectRef>
+          <a:fontRef idx="minor">
+            <a:schemeClr val="lt1"/>
+          </a:fontRef>
+        </p:style>
+        <p:txBody>
+          <a:bodyPr rtlCol="0" anchor="ctr"/>
+          <a:lstStyle/>
+          <a:p>
+            <a:pPr algn="ctr"/>
+            <a:r>
+              <a:rPr lang="en-US" dirty="0"/>
+              <a:t>Subscriber Service</a:t>
+            </a:r>
+          </a:p>
+          <a:p>
+            <a:pPr algn="ctr"/>
+            <a:r>
+              <a:rPr lang="en-US" sz="1200" dirty="0"/>
+              <a:t>(fabric:/</a:t>
+            </a:r>
+            <a:r>
+              <a:rPr lang="en-US" sz="1200" dirty="0" err="1"/>
+              <a:t>tenantapp</a:t>
+            </a:r>
+            <a:r>
+              <a:rPr lang="en-US" sz="1200" dirty="0"/>
+              <a:t>/</a:t>
+            </a:r>
+            <a:r>
+              <a:rPr lang="en-US" sz="1200" dirty="0">
+                <a:solidFill>
+                  <a:schemeClr val="accent2">
+                    <a:lumMod val="60000"/>
+                    <a:lumOff val="40000"/>
+                  </a:schemeClr>
+                </a:solidFill>
+              </a:rPr>
+              <a:t>tenantID1</a:t>
+            </a:r>
+            <a:r>
+              <a:rPr lang="en-US" sz="1200" dirty="0"/>
+              <a:t>/</a:t>
+            </a:r>
+            <a:r>
+              <a:rPr lang="en-US" sz="1200" dirty="0" err="1">
+                <a:solidFill>
+                  <a:schemeClr val="accent6">
+                    <a:lumMod val="60000"/>
+                    <a:lumOff val="40000"/>
+                  </a:schemeClr>
+                </a:solidFill>
+              </a:rPr>
+              <a:t>topicname</a:t>
+            </a:r>
+            <a:r>
+              <a:rPr lang="en-US" sz="1200" dirty="0"/>
+              <a:t>/</a:t>
+            </a:r>
+            <a:r>
+              <a:rPr lang="en-US" sz="1200" i="1" dirty="0">
+                <a:solidFill>
+                  <a:schemeClr val="accent4">
+                    <a:lumMod val="60000"/>
+                    <a:lumOff val="40000"/>
+                  </a:schemeClr>
+                </a:solidFill>
+              </a:rPr>
+              <a:t>subscriber</a:t>
+            </a:r>
+            <a:r>
+              <a:rPr lang="en-US" sz="1200" dirty="0"/>
+              <a:t>)</a:t>
+            </a:r>
+          </a:p>
+        </p:txBody>
+      </p:sp>
+      <p:sp>
+        <p:nvSpPr>
+          <p:cNvPr id="7" name="Rectangle 6"/>
+          <p:cNvSpPr/>
+          <p:nvPr/>
+        </p:nvSpPr>
+        <p:spPr>
+          <a:xfrm>
+            <a:off x="8461287" y="1497101"/>
+            <a:ext cx="2996705" cy="495199"/>
+          </a:xfrm>
+          <a:prstGeom prst="rect">
+            <a:avLst/>
+          </a:prstGeom>
+        </p:spPr>
+        <p:style>
+          <a:lnRef idx="2">
+            <a:schemeClr val="accent1">
+              <a:shade val="50000"/>
+            </a:schemeClr>
+          </a:lnRef>
+          <a:fillRef idx="1">
+            <a:schemeClr val="accent1"/>
+          </a:fillRef>
+          <a:effectRef idx="0">
+            <a:schemeClr val="accent1"/>
+          </a:effectRef>
+          <a:fontRef idx="minor">
+            <a:schemeClr val="lt1"/>
+          </a:fontRef>
+        </p:style>
+        <p:txBody>
+          <a:bodyPr rtlCol="0" anchor="ctr"/>
+          <a:lstStyle/>
+          <a:p>
+            <a:pPr algn="ctr"/>
+            <a:r>
+              <a:rPr lang="en-US" dirty="0"/>
+              <a:t>Topic Service</a:t>
+            </a:r>
+          </a:p>
+          <a:p>
+            <a:pPr algn="ctr"/>
+            <a:r>
+              <a:rPr lang="en-US" sz="1200" dirty="0"/>
+              <a:t>(fabric:/</a:t>
+            </a:r>
+            <a:r>
+              <a:rPr lang="en-US" sz="1200" dirty="0" err="1"/>
+              <a:t>tenantapp</a:t>
+            </a:r>
+            <a:r>
+              <a:rPr lang="en-US" sz="1200" dirty="0"/>
+              <a:t>/</a:t>
+            </a:r>
+            <a:r>
+              <a:rPr lang="en-US" sz="1200" dirty="0">
+                <a:solidFill>
+                  <a:schemeClr val="accent2">
+                    <a:lumMod val="60000"/>
+                    <a:lumOff val="40000"/>
+                  </a:schemeClr>
+                </a:solidFill>
+              </a:rPr>
+              <a:t>tenantID1</a:t>
+            </a:r>
+            <a:r>
+              <a:rPr lang="en-US" sz="1200" dirty="0"/>
+              <a:t>/</a:t>
+            </a:r>
+            <a:r>
+              <a:rPr lang="en-US" sz="1200" dirty="0" err="1">
+                <a:solidFill>
+                  <a:schemeClr val="accent6">
+                    <a:lumMod val="60000"/>
+                    <a:lumOff val="40000"/>
+                  </a:schemeClr>
+                </a:solidFill>
+              </a:rPr>
+              <a:t>topicname</a:t>
+            </a:r>
+            <a:r>
+              <a:rPr lang="en-US" sz="1200" dirty="0"/>
+              <a:t>)</a:t>
+            </a:r>
+            <a:endParaRPr lang="en-US" dirty="0"/>
+          </a:p>
+        </p:txBody>
+      </p:sp>
+      <p:sp>
+        <p:nvSpPr>
+          <p:cNvPr id="9" name="Rectangle 8"/>
+          <p:cNvSpPr/>
+          <p:nvPr/>
+        </p:nvSpPr>
+        <p:spPr>
+          <a:xfrm>
+            <a:off x="8461287" y="701461"/>
+            <a:ext cx="2996705" cy="530180"/>
+          </a:xfrm>
+          <a:prstGeom prst="rect">
+            <a:avLst/>
+          </a:prstGeom>
+        </p:spPr>
+        <p:style>
+          <a:lnRef idx="2">
+            <a:schemeClr val="accent1">
+              <a:shade val="50000"/>
+            </a:schemeClr>
+          </a:lnRef>
+          <a:fillRef idx="1">
+            <a:schemeClr val="accent1"/>
+          </a:fillRef>
+          <a:effectRef idx="0">
+            <a:schemeClr val="accent1"/>
+          </a:effectRef>
+          <a:fontRef idx="minor">
+            <a:schemeClr val="lt1"/>
+          </a:fontRef>
+        </p:style>
+        <p:txBody>
+          <a:bodyPr rtlCol="0" anchor="ctr"/>
+          <a:lstStyle/>
+          <a:p>
+            <a:pPr algn="ctr"/>
+            <a:r>
+              <a:rPr lang="en-US" dirty="0"/>
+              <a:t>Administration Service</a:t>
+            </a:r>
+          </a:p>
+          <a:p>
+            <a:pPr algn="ctr"/>
+            <a:r>
+              <a:rPr lang="en-US" sz="1200" dirty="0"/>
+              <a:t>(fabric:/</a:t>
+            </a:r>
+            <a:r>
+              <a:rPr lang="en-US" sz="1200" dirty="0" err="1"/>
+              <a:t>tenantapp</a:t>
+            </a:r>
+            <a:r>
+              <a:rPr lang="en-US" sz="1200" dirty="0"/>
+              <a:t>/</a:t>
+            </a:r>
+            <a:r>
+              <a:rPr lang="en-US" sz="1200" dirty="0">
+                <a:solidFill>
+                  <a:schemeClr val="accent2">
+                    <a:lumMod val="60000"/>
+                    <a:lumOff val="40000"/>
+                  </a:schemeClr>
+                </a:solidFill>
+              </a:rPr>
+              <a:t>tenantID1</a:t>
+            </a:r>
+            <a:r>
+              <a:rPr lang="en-US" sz="1200" dirty="0"/>
+              <a:t>)</a:t>
+            </a:r>
+          </a:p>
+        </p:txBody>
+      </p:sp>
+      <p:sp>
+        <p:nvSpPr>
+          <p:cNvPr id="11" name="Arrow: Right 10"/>
+          <p:cNvSpPr/>
+          <p:nvPr/>
+        </p:nvSpPr>
+        <p:spPr>
+          <a:xfrm>
+            <a:off x="1842796" y="1479737"/>
+            <a:ext cx="2391923" cy="484632"/>
+          </a:xfrm>
+          <a:prstGeom prst="rightArrow">
+            <a:avLst/>
+          </a:prstGeom>
+        </p:spPr>
+        <p:style>
+          <a:lnRef idx="2">
+            <a:schemeClr val="accent1">
+              <a:shade val="50000"/>
+            </a:schemeClr>
+          </a:lnRef>
+          <a:fillRef idx="1">
+            <a:schemeClr val="accent1"/>
+          </a:fillRef>
+          <a:effectRef idx="0">
+            <a:schemeClr val="accent1"/>
+          </a:effectRef>
+          <a:fontRef idx="minor">
+            <a:schemeClr val="lt1"/>
+          </a:fontRef>
+        </p:style>
+        <p:txBody>
+          <a:bodyPr rtlCol="0" anchor="ctr"/>
+          <a:lstStyle/>
+          <a:p>
+            <a:pPr algn="ctr"/>
+            <a:r>
+              <a:rPr lang="en-US" sz="1400" dirty="0"/>
+              <a:t>Put: /</a:t>
+            </a:r>
+            <a:r>
+              <a:rPr lang="en-US" sz="1400" dirty="0">
+                <a:solidFill>
+                  <a:schemeClr val="accent2">
+                    <a:lumMod val="60000"/>
+                    <a:lumOff val="40000"/>
+                  </a:schemeClr>
+                </a:solidFill>
+              </a:rPr>
+              <a:t>tenantId1</a:t>
+            </a:r>
+            <a:r>
+              <a:rPr lang="en-US" sz="1400" dirty="0"/>
+              <a:t>/</a:t>
+            </a:r>
+            <a:r>
+              <a:rPr lang="en-US" sz="1400" dirty="0" err="1">
+                <a:solidFill>
+                  <a:schemeClr val="accent6">
+                    <a:lumMod val="60000"/>
+                    <a:lumOff val="40000"/>
+                  </a:schemeClr>
+                </a:solidFill>
+              </a:rPr>
+              <a:t>topicname</a:t>
+            </a:r>
+            <a:endParaRPr lang="en-US" sz="1400" dirty="0">
+              <a:solidFill>
+                <a:schemeClr val="accent6">
+                  <a:lumMod val="60000"/>
+                  <a:lumOff val="40000"/>
+                </a:schemeClr>
+              </a:solidFill>
+            </a:endParaRPr>
+          </a:p>
+        </p:txBody>
+      </p:sp>
+      <p:sp>
+        <p:nvSpPr>
+          <p:cNvPr id="12" name="TextBox 11"/>
+          <p:cNvSpPr txBox="1"/>
+          <p:nvPr/>
+        </p:nvSpPr>
+        <p:spPr>
+          <a:xfrm>
+            <a:off x="1791477" y="1056794"/>
+            <a:ext cx="2369975" cy="461665"/>
+          </a:xfrm>
+          <a:prstGeom prst="rect">
+            <a:avLst/>
+          </a:prstGeom>
+          <a:noFill/>
+        </p:spPr>
+        <p:txBody>
+          <a:bodyPr wrap="square" rtlCol="0">
+            <a:spAutoFit/>
+          </a:bodyPr>
+          <a:lstStyle/>
+          <a:p>
+            <a:r>
+              <a:rPr lang="en-US" sz="1200" b="1" dirty="0">
+                <a:solidFill>
+                  <a:srgbClr val="FF0000"/>
+                </a:solidFill>
+              </a:rPr>
+              <a:t>1) </a:t>
+            </a:r>
+            <a:r>
+              <a:rPr lang="en-US" sz="1200" dirty="0"/>
+              <a:t>Client sends a REST API request to publish a message to a topic. </a:t>
+            </a:r>
+          </a:p>
+        </p:txBody>
+      </p:sp>
+      <p:cxnSp>
+        <p:nvCxnSpPr>
+          <p:cNvPr id="15" name="Connector: Elbow 14"/>
+          <p:cNvCxnSpPr>
+            <a:stCxn id="5" idx="0"/>
+            <a:endCxn id="9" idx="1"/>
+          </p:cNvCxnSpPr>
+          <p:nvPr/>
+        </p:nvCxnSpPr>
+        <p:spPr>
+          <a:xfrm rot="5400000" flipH="1" flipV="1">
+            <a:off x="6537242" y="-444307"/>
+            <a:ext cx="513186" cy="3334903"/>
+          </a:xfrm>
+          <a:prstGeom prst="bentConnector2">
+            <a:avLst/>
+          </a:prstGeom>
+          <a:ln w="38100">
+            <a:headEnd type="triangle" w="med" len="med"/>
+            <a:tailEnd type="triangle" w="med" len="med"/>
+          </a:ln>
+        </p:spPr>
+        <p:style>
+          <a:lnRef idx="1">
+            <a:schemeClr val="accent1"/>
+          </a:lnRef>
+          <a:fillRef idx="0">
+            <a:schemeClr val="accent1"/>
+          </a:fillRef>
+          <a:effectRef idx="0">
+            <a:schemeClr val="accent1"/>
+          </a:effectRef>
+          <a:fontRef idx="minor">
+            <a:schemeClr val="tx1"/>
+          </a:fontRef>
+        </p:style>
+      </p:cxnSp>
+      <p:sp>
+        <p:nvSpPr>
+          <p:cNvPr id="19" name="TextBox 18"/>
+          <p:cNvSpPr txBox="1"/>
+          <p:nvPr/>
+        </p:nvSpPr>
+        <p:spPr>
+          <a:xfrm>
+            <a:off x="5126383" y="458432"/>
+            <a:ext cx="3086467" cy="461665"/>
+          </a:xfrm>
+          <a:prstGeom prst="rect">
+            <a:avLst/>
+          </a:prstGeom>
+          <a:noFill/>
+        </p:spPr>
+        <p:txBody>
+          <a:bodyPr wrap="square" rtlCol="0">
+            <a:spAutoFit/>
+          </a:bodyPr>
+          <a:lstStyle/>
+          <a:p>
+            <a:r>
+              <a:rPr lang="en-US" sz="1200" b="1" dirty="0">
+                <a:solidFill>
+                  <a:srgbClr val="FF0000"/>
+                </a:solidFill>
+              </a:rPr>
+              <a:t>2) </a:t>
+            </a:r>
+            <a:r>
+              <a:rPr lang="en-US" sz="1200" dirty="0"/>
+              <a:t>Using the </a:t>
+            </a:r>
+            <a:r>
+              <a:rPr lang="en-US" sz="1200" b="1" dirty="0" err="1">
+                <a:solidFill>
+                  <a:schemeClr val="accent2">
+                    <a:lumMod val="60000"/>
+                    <a:lumOff val="40000"/>
+                  </a:schemeClr>
+                </a:solidFill>
+              </a:rPr>
+              <a:t>tenantID</a:t>
+            </a:r>
+            <a:r>
+              <a:rPr lang="en-US" sz="1200" dirty="0"/>
+              <a:t> contained in the request path. The Router will authenticate the request. </a:t>
+            </a:r>
+          </a:p>
+        </p:txBody>
+      </p:sp>
+      <p:cxnSp>
+        <p:nvCxnSpPr>
+          <p:cNvPr id="20" name="Connector: Elbow 19"/>
+          <p:cNvCxnSpPr>
+            <a:stCxn id="5" idx="3"/>
+            <a:endCxn id="7" idx="1"/>
+          </p:cNvCxnSpPr>
+          <p:nvPr/>
+        </p:nvCxnSpPr>
+        <p:spPr>
+          <a:xfrm flipV="1">
+            <a:off x="5966730" y="1744701"/>
+            <a:ext cx="2494557" cy="126"/>
+          </a:xfrm>
+          <a:prstGeom prst="bentConnector3">
+            <a:avLst>
+              <a:gd name="adj1" fmla="val 50000"/>
+            </a:avLst>
+          </a:prstGeom>
+          <a:ln w="38100">
+            <a:headEnd type="triangle" w="med" len="med"/>
+            <a:tailEnd type="triangle" w="med" len="med"/>
+          </a:ln>
+        </p:spPr>
+        <p:style>
+          <a:lnRef idx="1">
+            <a:schemeClr val="accent1"/>
+          </a:lnRef>
+          <a:fillRef idx="0">
+            <a:schemeClr val="accent1"/>
+          </a:fillRef>
+          <a:effectRef idx="0">
+            <a:schemeClr val="accent1"/>
+          </a:effectRef>
+          <a:fontRef idx="minor">
+            <a:schemeClr val="tx1"/>
+          </a:fontRef>
+        </p:style>
+      </p:cxnSp>
+      <p:sp>
+        <p:nvSpPr>
+          <p:cNvPr id="28" name="TextBox 27"/>
+          <p:cNvSpPr txBox="1"/>
+          <p:nvPr/>
+        </p:nvSpPr>
+        <p:spPr>
+          <a:xfrm>
+            <a:off x="5966730" y="1885204"/>
+            <a:ext cx="2494557" cy="1015663"/>
+          </a:xfrm>
+          <a:prstGeom prst="rect">
+            <a:avLst/>
+          </a:prstGeom>
+          <a:noFill/>
+        </p:spPr>
+        <p:txBody>
+          <a:bodyPr wrap="square" rtlCol="0">
+            <a:spAutoFit/>
+          </a:bodyPr>
+          <a:lstStyle/>
+          <a:p>
+            <a:r>
+              <a:rPr lang="en-US" sz="1200" b="1" dirty="0">
+                <a:solidFill>
+                  <a:srgbClr val="FF0000"/>
+                </a:solidFill>
+              </a:rPr>
+              <a:t>3) </a:t>
+            </a:r>
+            <a:r>
+              <a:rPr lang="en-US" sz="1200" dirty="0"/>
+              <a:t>Using the </a:t>
+            </a:r>
+            <a:r>
+              <a:rPr lang="en-US" sz="1200" b="1" dirty="0" err="1">
+                <a:solidFill>
+                  <a:schemeClr val="accent6">
+                    <a:lumMod val="60000"/>
+                    <a:lumOff val="40000"/>
+                  </a:schemeClr>
+                </a:solidFill>
+              </a:rPr>
+              <a:t>topicname</a:t>
+            </a:r>
+            <a:r>
+              <a:rPr lang="en-US" sz="1200" dirty="0"/>
+              <a:t> contained in the request path, the router will pass the authenticated request payload along to the specified topic service for processing.</a:t>
+            </a:r>
+          </a:p>
+        </p:txBody>
+      </p:sp>
+      <p:sp>
+        <p:nvSpPr>
+          <p:cNvPr id="31" name="Oval 30"/>
+          <p:cNvSpPr/>
+          <p:nvPr/>
+        </p:nvSpPr>
+        <p:spPr>
+          <a:xfrm>
+            <a:off x="166255" y="2962992"/>
+            <a:ext cx="1844353" cy="914400"/>
+          </a:xfrm>
+          <a:prstGeom prst="ellipse">
+            <a:avLst/>
+          </a:prstGeom>
+        </p:spPr>
+        <p:style>
+          <a:lnRef idx="2">
+            <a:schemeClr val="accent1">
+              <a:shade val="50000"/>
+            </a:schemeClr>
+          </a:lnRef>
+          <a:fillRef idx="1">
+            <a:schemeClr val="accent1"/>
+          </a:fillRef>
+          <a:effectRef idx="0">
+            <a:schemeClr val="accent1"/>
+          </a:effectRef>
+          <a:fontRef idx="minor">
+            <a:schemeClr val="lt1"/>
+          </a:fontRef>
+        </p:style>
+        <p:txBody>
+          <a:bodyPr rtlCol="0" anchor="ctr"/>
+          <a:lstStyle/>
+          <a:p>
+            <a:pPr algn="ctr"/>
+            <a:r>
+              <a:rPr lang="en-US" dirty="0"/>
+              <a:t>Subscribing Client App</a:t>
+            </a:r>
+          </a:p>
+        </p:txBody>
+      </p:sp>
+      <p:sp>
+        <p:nvSpPr>
+          <p:cNvPr id="32" name="Rectangle 31"/>
+          <p:cNvSpPr/>
+          <p:nvPr/>
+        </p:nvSpPr>
+        <p:spPr>
+          <a:xfrm>
+            <a:off x="4502194" y="3825830"/>
+            <a:ext cx="1680693" cy="530180"/>
+          </a:xfrm>
+          <a:prstGeom prst="rect">
+            <a:avLst/>
+          </a:prstGeom>
+        </p:spPr>
+        <p:style>
+          <a:lnRef idx="2">
+            <a:schemeClr val="accent1">
+              <a:shade val="50000"/>
+            </a:schemeClr>
+          </a:lnRef>
+          <a:fillRef idx="1">
+            <a:schemeClr val="accent1"/>
+          </a:fillRef>
+          <a:effectRef idx="0">
+            <a:schemeClr val="accent1"/>
+          </a:effectRef>
+          <a:fontRef idx="minor">
+            <a:schemeClr val="lt1"/>
+          </a:fontRef>
+        </p:style>
+        <p:txBody>
+          <a:bodyPr rtlCol="0" anchor="ctr"/>
+          <a:lstStyle/>
+          <a:p>
+            <a:pPr algn="ctr"/>
+            <a:r>
+              <a:rPr lang="en-US" dirty="0"/>
+              <a:t>Request Router</a:t>
+            </a:r>
+          </a:p>
+        </p:txBody>
+      </p:sp>
+      <p:sp>
+        <p:nvSpPr>
+          <p:cNvPr id="33" name="Arrow: Right 32"/>
+          <p:cNvSpPr/>
+          <p:nvPr/>
+        </p:nvSpPr>
+        <p:spPr>
+          <a:xfrm>
+            <a:off x="373225" y="3848604"/>
+            <a:ext cx="4051994" cy="484632"/>
+          </a:xfrm>
+          <a:prstGeom prst="rightArrow">
+            <a:avLst/>
+          </a:prstGeom>
+        </p:spPr>
+        <p:style>
+          <a:lnRef idx="2">
+            <a:schemeClr val="accent1">
+              <a:shade val="50000"/>
+            </a:schemeClr>
+          </a:lnRef>
+          <a:fillRef idx="1">
+            <a:schemeClr val="accent1"/>
+          </a:fillRef>
+          <a:effectRef idx="0">
+            <a:schemeClr val="accent1"/>
+          </a:effectRef>
+          <a:fontRef idx="minor">
+            <a:schemeClr val="lt1"/>
+          </a:fontRef>
+        </p:style>
+        <p:txBody>
+          <a:bodyPr rtlCol="0" anchor="ctr"/>
+          <a:lstStyle/>
+          <a:p>
+            <a:pPr algn="ctr"/>
+            <a:r>
+              <a:rPr lang="en-US" sz="1400" dirty="0"/>
+              <a:t>GET: /</a:t>
+            </a:r>
+            <a:r>
+              <a:rPr lang="en-US" sz="1400" dirty="0">
+                <a:solidFill>
+                  <a:schemeClr val="accent2">
+                    <a:lumMod val="60000"/>
+                    <a:lumOff val="40000"/>
+                  </a:schemeClr>
+                </a:solidFill>
+              </a:rPr>
+              <a:t>tenantId1</a:t>
+            </a:r>
+            <a:r>
+              <a:rPr lang="en-US" sz="1400" dirty="0"/>
+              <a:t>/</a:t>
+            </a:r>
+            <a:r>
+              <a:rPr lang="en-US" sz="1400" dirty="0" err="1">
+                <a:solidFill>
+                  <a:schemeClr val="accent6">
+                    <a:lumMod val="60000"/>
+                    <a:lumOff val="40000"/>
+                  </a:schemeClr>
+                </a:solidFill>
+              </a:rPr>
+              <a:t>topicname</a:t>
+            </a:r>
+            <a:r>
+              <a:rPr lang="en-US" sz="1400" dirty="0"/>
+              <a:t>/</a:t>
+            </a:r>
+            <a:r>
+              <a:rPr lang="en-US" sz="1400" dirty="0">
+                <a:solidFill>
+                  <a:schemeClr val="accent4">
+                    <a:lumMod val="60000"/>
+                    <a:lumOff val="40000"/>
+                  </a:schemeClr>
+                </a:solidFill>
+              </a:rPr>
+              <a:t>subscriber</a:t>
+            </a:r>
+          </a:p>
+        </p:txBody>
+      </p:sp>
+      <p:sp>
+        <p:nvSpPr>
+          <p:cNvPr id="34" name="TextBox 33"/>
+          <p:cNvSpPr txBox="1"/>
+          <p:nvPr/>
+        </p:nvSpPr>
+        <p:spPr>
+          <a:xfrm>
+            <a:off x="2015224" y="3341391"/>
+            <a:ext cx="2369975" cy="461665"/>
+          </a:xfrm>
+          <a:prstGeom prst="rect">
+            <a:avLst/>
+          </a:prstGeom>
+          <a:noFill/>
+        </p:spPr>
+        <p:txBody>
+          <a:bodyPr wrap="square" rtlCol="0">
+            <a:spAutoFit/>
+          </a:bodyPr>
+          <a:lstStyle/>
+          <a:p>
+            <a:r>
+              <a:rPr lang="en-US" sz="1200" b="1" dirty="0">
+                <a:solidFill>
+                  <a:srgbClr val="FF0000"/>
+                </a:solidFill>
+              </a:rPr>
+              <a:t>5) </a:t>
+            </a:r>
+            <a:r>
+              <a:rPr lang="en-US" sz="1200" dirty="0"/>
+              <a:t>Client sends a REST API request to get a message to a subscriber. </a:t>
+            </a:r>
+          </a:p>
+        </p:txBody>
+      </p:sp>
+      <p:cxnSp>
+        <p:nvCxnSpPr>
+          <p:cNvPr id="35" name="Connector: Elbow 34"/>
+          <p:cNvCxnSpPr>
+            <a:stCxn id="32" idx="3"/>
+            <a:endCxn id="6" idx="1"/>
+          </p:cNvCxnSpPr>
+          <p:nvPr/>
+        </p:nvCxnSpPr>
+        <p:spPr>
+          <a:xfrm flipV="1">
+            <a:off x="6182887" y="4087085"/>
+            <a:ext cx="1570852" cy="3835"/>
+          </a:xfrm>
+          <a:prstGeom prst="bentConnector3">
+            <a:avLst>
+              <a:gd name="adj1" fmla="val 50000"/>
+            </a:avLst>
+          </a:prstGeom>
+          <a:ln w="38100">
+            <a:headEnd type="triangle" w="med" len="med"/>
+            <a:tailEnd type="triangle" w="med" len="med"/>
+          </a:ln>
+        </p:spPr>
+        <p:style>
+          <a:lnRef idx="1">
+            <a:schemeClr val="accent1"/>
+          </a:lnRef>
+          <a:fillRef idx="0">
+            <a:schemeClr val="accent1"/>
+          </a:fillRef>
+          <a:effectRef idx="0">
+            <a:schemeClr val="accent1"/>
+          </a:effectRef>
+          <a:fontRef idx="minor">
+            <a:schemeClr val="tx1"/>
+          </a:fontRef>
+        </p:style>
+      </p:cxnSp>
+      <p:sp>
+        <p:nvSpPr>
+          <p:cNvPr id="36" name="TextBox 35"/>
+          <p:cNvSpPr txBox="1"/>
+          <p:nvPr/>
+        </p:nvSpPr>
+        <p:spPr>
+          <a:xfrm>
+            <a:off x="4438424" y="4449976"/>
+            <a:ext cx="2363591" cy="830997"/>
+          </a:xfrm>
+          <a:prstGeom prst="rect">
+            <a:avLst/>
+          </a:prstGeom>
+          <a:noFill/>
+        </p:spPr>
+        <p:txBody>
+          <a:bodyPr wrap="square" rtlCol="0">
+            <a:spAutoFit/>
+          </a:bodyPr>
+          <a:lstStyle/>
+          <a:p>
+            <a:r>
+              <a:rPr lang="en-US" sz="1200" b="1" dirty="0">
+                <a:solidFill>
+                  <a:srgbClr val="FF0000"/>
+                </a:solidFill>
+              </a:rPr>
+              <a:t>6) </a:t>
+            </a:r>
+            <a:r>
+              <a:rPr lang="en-US" sz="1200" dirty="0"/>
+              <a:t>Using the </a:t>
+            </a:r>
+            <a:r>
+              <a:rPr lang="en-US" sz="1200" dirty="0" err="1"/>
+              <a:t>tenantID</a:t>
+            </a:r>
+            <a:r>
+              <a:rPr lang="en-US" sz="1200" dirty="0"/>
+              <a:t> contained in the request path. The Router will authenticate the request.</a:t>
+            </a:r>
+          </a:p>
+          <a:p>
+            <a:r>
+              <a:rPr lang="en-US" sz="1200" b="1" i="1" dirty="0"/>
+              <a:t>(no line drawn for simplicity sake)</a:t>
+            </a:r>
+            <a:r>
+              <a:rPr lang="en-US" sz="1200" dirty="0"/>
+              <a:t> </a:t>
+            </a:r>
+          </a:p>
+        </p:txBody>
+      </p:sp>
+      <p:sp>
+        <p:nvSpPr>
+          <p:cNvPr id="37" name="TextBox 36"/>
+          <p:cNvSpPr txBox="1"/>
+          <p:nvPr/>
+        </p:nvSpPr>
+        <p:spPr>
+          <a:xfrm>
+            <a:off x="7322087" y="4442306"/>
+            <a:ext cx="3444748" cy="1015663"/>
+          </a:xfrm>
+          <a:prstGeom prst="rect">
+            <a:avLst/>
+          </a:prstGeom>
+          <a:noFill/>
+        </p:spPr>
+        <p:txBody>
+          <a:bodyPr wrap="square" rtlCol="0">
+            <a:spAutoFit/>
+          </a:bodyPr>
+          <a:lstStyle/>
+          <a:p>
+            <a:r>
+              <a:rPr lang="en-US" sz="1200" b="1" dirty="0">
+                <a:solidFill>
+                  <a:srgbClr val="FF0000"/>
+                </a:solidFill>
+              </a:rPr>
+              <a:t>7) </a:t>
+            </a:r>
+            <a:r>
+              <a:rPr lang="en-US" sz="1200" dirty="0"/>
+              <a:t>Using the subscriber name contained in the request path, the router passes the authenticated request payload along to the specified subscriber service for processing and returns response back to the original client.</a:t>
+            </a:r>
+          </a:p>
+        </p:txBody>
+      </p:sp>
+      <p:sp>
+        <p:nvSpPr>
+          <p:cNvPr id="40" name="TextBox 39"/>
+          <p:cNvSpPr txBox="1"/>
+          <p:nvPr/>
+        </p:nvSpPr>
+        <p:spPr>
+          <a:xfrm>
+            <a:off x="9239152" y="2085829"/>
+            <a:ext cx="2494557" cy="1754326"/>
+          </a:xfrm>
+          <a:prstGeom prst="rect">
+            <a:avLst/>
+          </a:prstGeom>
+          <a:noFill/>
+        </p:spPr>
+        <p:txBody>
+          <a:bodyPr wrap="square" rtlCol="0">
+            <a:spAutoFit/>
+          </a:bodyPr>
+          <a:lstStyle/>
+          <a:p>
+            <a:r>
+              <a:rPr lang="en-US" sz="1200" b="1" dirty="0">
+                <a:solidFill>
+                  <a:srgbClr val="FF0000"/>
+                </a:solidFill>
+              </a:rPr>
+              <a:t>4) </a:t>
+            </a:r>
+            <a:r>
+              <a:rPr lang="en-US" sz="1200" dirty="0"/>
+              <a:t>The topic listens for a change event on its queue collection. When this occurs, it reads a copy of that message and writes it to subscribers to that topic, then deletes the message. The read, write, delete operations are all wrapped in a single transaction to help prevent loss of data. </a:t>
+            </a:r>
+          </a:p>
+        </p:txBody>
+      </p:sp>
+      <p:cxnSp>
+        <p:nvCxnSpPr>
+          <p:cNvPr id="41" name="Connector: Elbow 40"/>
+          <p:cNvCxnSpPr>
+            <a:stCxn id="7" idx="3"/>
+            <a:endCxn id="6" idx="3"/>
+          </p:cNvCxnSpPr>
+          <p:nvPr/>
+        </p:nvCxnSpPr>
+        <p:spPr>
+          <a:xfrm>
+            <a:off x="11457992" y="1744701"/>
+            <a:ext cx="12700" cy="2342384"/>
+          </a:xfrm>
+          <a:prstGeom prst="bentConnector3">
+            <a:avLst>
+              <a:gd name="adj1" fmla="val 1800000"/>
+            </a:avLst>
+          </a:prstGeom>
+          <a:ln w="38100">
+            <a:headEnd type="triangle" w="med" len="med"/>
+            <a:tailEnd type="triangle" w="med" len="med"/>
+          </a:ln>
+        </p:spPr>
+        <p:style>
+          <a:lnRef idx="1">
+            <a:schemeClr val="accent1"/>
+          </a:lnRef>
+          <a:fillRef idx="0">
+            <a:schemeClr val="accent1"/>
+          </a:fillRef>
+          <a:effectRef idx="0">
+            <a:schemeClr val="accent1"/>
+          </a:effectRef>
+          <a:fontRef idx="minor">
+            <a:schemeClr val="tx1"/>
+          </a:fontRef>
+        </p:style>
+      </p:cxnSp>
+    </p:spTree>
+    <p:extLst>
+      <p:ext uri="{BB962C8B-B14F-4D97-AF65-F5344CB8AC3E}">
+        <p14:creationId xmlns:p14="http://schemas.microsoft.com/office/powerpoint/2010/main" val="1899534745"/>
+      </p:ext>
+    </p:extLst>
+  </p:cSld>
+  <p:clrMapOvr>
+    <a:masterClrMapping/>
+  </p:clrMapOvr>
+</p:sld>
+</file>
+
+<file path=ppt/slides/slide3.xml><?xml version="1.0" encoding="utf-8"?>
+<p:sld xmlns:a="http://schemas.openxmlformats.org/drawingml/2006/main" xmlns:r="http://schemas.openxmlformats.org/officeDocument/2006/relationships" xmlns:p="http://schemas.openxmlformats.org/presentationml/2006/main">
+  <p:cSld>
+    <p:spTree>
+      <p:nvGrpSpPr>
+        <p:cNvPr id="1" name=""/>
+        <p:cNvGrpSpPr/>
+        <p:nvPr/>
+      </p:nvGrpSpPr>
+      <p:grpSpPr>
+        <a:xfrm>
+          <a:off x="0" y="0"/>
+          <a:ext cx="0" cy="0"/>
+          <a:chOff x="0" y="0"/>
+          <a:chExt cx="0" cy="0"/>
+        </a:xfrm>
+      </p:grpSpPr>
+      <p:sp>
+        <p:nvSpPr>
+          <p:cNvPr id="4" name="Title 1"/>
+          <p:cNvSpPr txBox="1">
+            <a:spLocks/>
+          </p:cNvSpPr>
+          <p:nvPr/>
+        </p:nvSpPr>
+        <p:spPr>
+          <a:xfrm>
+            <a:off x="838200" y="365126"/>
+            <a:ext cx="10515600" cy="530614"/>
+          </a:xfrm>
+          <a:prstGeom prst="rect">
+            <a:avLst/>
+          </a:prstGeom>
+        </p:spPr>
+        <p:txBody>
+          <a:bodyPr vert="horz" lIns="91440" tIns="45720" rIns="91440" bIns="45720" rtlCol="0" anchor="ctr">
+            <a:normAutofit fontScale="90000" lnSpcReduction="20000"/>
+          </a:bodyPr>
+          <a:lstStyle>
+            <a:lvl1pPr algn="l" defTabSz="914400" rtl="0" eaLnBrk="1" latinLnBrk="0" hangingPunct="1">
+              <a:lnSpc>
+                <a:spcPct val="90000"/>
+              </a:lnSpc>
+              <a:spcBef>
+                <a:spcPct val="0"/>
+              </a:spcBef>
+              <a:buNone/>
+              <a:defRPr sz="4400" kern="1200">
+                <a:solidFill>
+                  <a:schemeClr val="tx1"/>
+                </a:solidFill>
+                <a:latin typeface="+mj-lt"/>
+                <a:ea typeface="+mj-ea"/>
+                <a:cs typeface="+mj-cs"/>
+              </a:defRPr>
+            </a:lvl1pPr>
+          </a:lstStyle>
+          <a:p>
+            <a:r>
+              <a:rPr lang="en-US" dirty="0"/>
+              <a:t>Administration Flow</a:t>
+            </a:r>
+          </a:p>
+        </p:txBody>
+      </p:sp>
+      <p:sp>
+        <p:nvSpPr>
+          <p:cNvPr id="5" name="Oval 4"/>
+          <p:cNvSpPr/>
+          <p:nvPr/>
+        </p:nvSpPr>
+        <p:spPr>
+          <a:xfrm>
+            <a:off x="111966" y="1597259"/>
+            <a:ext cx="1679511" cy="914400"/>
+          </a:xfrm>
+          <a:prstGeom prst="ellipse">
+            <a:avLst/>
+          </a:prstGeom>
+        </p:spPr>
+        <p:style>
+          <a:lnRef idx="2">
+            <a:schemeClr val="accent1">
+              <a:shade val="50000"/>
+            </a:schemeClr>
+          </a:lnRef>
+          <a:fillRef idx="1">
+            <a:schemeClr val="accent1"/>
+          </a:fillRef>
+          <a:effectRef idx="0">
+            <a:schemeClr val="accent1"/>
+          </a:effectRef>
+          <a:fontRef idx="minor">
+            <a:schemeClr val="lt1"/>
+          </a:fontRef>
+        </p:style>
+        <p:txBody>
+          <a:bodyPr rtlCol="0" anchor="ctr"/>
+          <a:lstStyle/>
+          <a:p>
+            <a:pPr algn="ctr"/>
+            <a:r>
+              <a:rPr lang="en-US" dirty="0"/>
+              <a:t>Admin</a:t>
+            </a:r>
+          </a:p>
+          <a:p>
+            <a:pPr algn="ctr"/>
+            <a:r>
+              <a:rPr lang="en-US" dirty="0"/>
+              <a:t>App</a:t>
+            </a:r>
+          </a:p>
+        </p:txBody>
+      </p:sp>
+      <p:sp>
+        <p:nvSpPr>
+          <p:cNvPr id="6" name="Rectangle 5"/>
+          <p:cNvSpPr/>
+          <p:nvPr/>
+        </p:nvSpPr>
+        <p:spPr>
+          <a:xfrm>
+            <a:off x="4286037" y="1801699"/>
+            <a:ext cx="1680693" cy="530180"/>
+          </a:xfrm>
+          <a:prstGeom prst="rect">
+            <a:avLst/>
+          </a:prstGeom>
+        </p:spPr>
+        <p:style>
+          <a:lnRef idx="2">
+            <a:schemeClr val="accent1">
+              <a:shade val="50000"/>
+            </a:schemeClr>
+          </a:lnRef>
+          <a:fillRef idx="1">
+            <a:schemeClr val="accent1"/>
+          </a:fillRef>
+          <a:effectRef idx="0">
+            <a:schemeClr val="accent1"/>
+          </a:effectRef>
+          <a:fontRef idx="minor">
+            <a:schemeClr val="lt1"/>
+          </a:fontRef>
+        </p:style>
+        <p:txBody>
+          <a:bodyPr rtlCol="0" anchor="ctr"/>
+          <a:lstStyle/>
+          <a:p>
+            <a:pPr algn="ctr"/>
+            <a:r>
+              <a:rPr lang="en-US" dirty="0"/>
+              <a:t>Admin Service</a:t>
+            </a:r>
+          </a:p>
+        </p:txBody>
+      </p:sp>
+      <p:sp>
+        <p:nvSpPr>
+          <p:cNvPr id="7" name="Arrow: Right 6"/>
+          <p:cNvSpPr/>
+          <p:nvPr/>
+        </p:nvSpPr>
+        <p:spPr>
+          <a:xfrm>
+            <a:off x="1842796" y="1801699"/>
+            <a:ext cx="2391923" cy="484632"/>
+          </a:xfrm>
+          <a:prstGeom prst="rightArrow">
+            <a:avLst/>
+          </a:prstGeom>
+        </p:spPr>
+        <p:style>
+          <a:lnRef idx="2">
+            <a:schemeClr val="accent1">
+              <a:shade val="50000"/>
+            </a:schemeClr>
+          </a:lnRef>
+          <a:fillRef idx="1">
+            <a:schemeClr val="accent1"/>
+          </a:fillRef>
+          <a:effectRef idx="0">
+            <a:schemeClr val="accent1"/>
+          </a:effectRef>
+          <a:fontRef idx="minor">
+            <a:schemeClr val="lt1"/>
+          </a:fontRef>
+        </p:style>
+        <p:txBody>
+          <a:bodyPr rtlCol="0" anchor="ctr"/>
+          <a:lstStyle/>
+          <a:p>
+            <a:pPr algn="ctr"/>
+            <a:r>
+              <a:rPr lang="en-US" sz="1400" dirty="0"/>
+              <a:t>Post: /</a:t>
+            </a:r>
+            <a:r>
+              <a:rPr lang="en-US" sz="1400" dirty="0" err="1">
+                <a:solidFill>
+                  <a:schemeClr val="bg1"/>
+                </a:solidFill>
+              </a:rPr>
+              <a:t>api</a:t>
+            </a:r>
+            <a:r>
+              <a:rPr lang="en-US" sz="1400" dirty="0"/>
+              <a:t>/</a:t>
+            </a:r>
+            <a:endParaRPr lang="en-US" sz="1400" dirty="0">
+              <a:solidFill>
+                <a:schemeClr val="accent6">
+                  <a:lumMod val="60000"/>
+                  <a:lumOff val="40000"/>
+                </a:schemeClr>
+              </a:solidFill>
+            </a:endParaRPr>
+          </a:p>
+        </p:txBody>
+      </p:sp>
+      <p:sp>
+        <p:nvSpPr>
+          <p:cNvPr id="8" name="TextBox 7"/>
+          <p:cNvSpPr txBox="1"/>
+          <p:nvPr/>
+        </p:nvSpPr>
+        <p:spPr>
+          <a:xfrm>
+            <a:off x="1791477" y="1378756"/>
+            <a:ext cx="2369975" cy="461665"/>
+          </a:xfrm>
+          <a:prstGeom prst="rect">
+            <a:avLst/>
+          </a:prstGeom>
+          <a:noFill/>
+        </p:spPr>
+        <p:txBody>
+          <a:bodyPr wrap="square" rtlCol="0">
+            <a:spAutoFit/>
+          </a:bodyPr>
+          <a:lstStyle/>
+          <a:p>
+            <a:r>
+              <a:rPr lang="en-US" sz="1200" b="1" dirty="0">
+                <a:solidFill>
+                  <a:srgbClr val="FF0000"/>
+                </a:solidFill>
+              </a:rPr>
+              <a:t>1) </a:t>
+            </a:r>
+            <a:r>
+              <a:rPr lang="en-US" sz="1200" dirty="0"/>
+              <a:t>Client sends a REST API request to create a new tenant. </a:t>
+            </a:r>
+          </a:p>
+        </p:txBody>
+      </p:sp>
+      <p:cxnSp>
+        <p:nvCxnSpPr>
+          <p:cNvPr id="10" name="Connector: Elbow 9"/>
+          <p:cNvCxnSpPr/>
+          <p:nvPr/>
+        </p:nvCxnSpPr>
+        <p:spPr>
+          <a:xfrm flipV="1">
+            <a:off x="5126383" y="1305883"/>
+            <a:ext cx="2707557" cy="495817"/>
+          </a:xfrm>
+          <a:prstGeom prst="bentConnector3">
+            <a:avLst>
+              <a:gd name="adj1" fmla="val -183"/>
+            </a:avLst>
+          </a:prstGeom>
+          <a:ln w="38100">
+            <a:headEnd type="triangle" w="med" len="med"/>
+            <a:tailEnd type="triangle" w="med" len="med"/>
+          </a:ln>
+        </p:spPr>
+        <p:style>
+          <a:lnRef idx="1">
+            <a:schemeClr val="accent1"/>
+          </a:lnRef>
+          <a:fillRef idx="0">
+            <a:schemeClr val="accent1"/>
+          </a:fillRef>
+          <a:effectRef idx="0">
+            <a:schemeClr val="accent1"/>
+          </a:effectRef>
+          <a:fontRef idx="minor">
+            <a:schemeClr val="tx1"/>
+          </a:fontRef>
+        </p:style>
+      </p:cxnSp>
+      <p:sp>
+        <p:nvSpPr>
+          <p:cNvPr id="11" name="TextBox 10"/>
+          <p:cNvSpPr txBox="1"/>
+          <p:nvPr/>
+        </p:nvSpPr>
+        <p:spPr>
+          <a:xfrm>
+            <a:off x="5126383" y="403868"/>
+            <a:ext cx="3223867" cy="830997"/>
+          </a:xfrm>
+          <a:prstGeom prst="rect">
+            <a:avLst/>
+          </a:prstGeom>
+          <a:noFill/>
+        </p:spPr>
+        <p:txBody>
+          <a:bodyPr wrap="square" rtlCol="0">
+            <a:spAutoFit/>
+          </a:bodyPr>
+          <a:lstStyle/>
+          <a:p>
+            <a:r>
+              <a:rPr lang="en-US" sz="1200" b="1" dirty="0">
+                <a:solidFill>
+                  <a:srgbClr val="FF0000"/>
+                </a:solidFill>
+              </a:rPr>
+              <a:t>2) </a:t>
+            </a:r>
+            <a:r>
+              <a:rPr lang="en-US" sz="1200" dirty="0"/>
+              <a:t>Admin Service authenticates request. If tenant doesn’t already exist, use service fabric to create a new instance of the tenant Application type using the tenant ID as part of the path. </a:t>
+            </a:r>
+          </a:p>
+        </p:txBody>
+      </p:sp>
+      <p:sp>
+        <p:nvSpPr>
+          <p:cNvPr id="12" name="Rectangle: Rounded Corners 11"/>
+          <p:cNvSpPr/>
+          <p:nvPr/>
+        </p:nvSpPr>
+        <p:spPr>
+          <a:xfrm>
+            <a:off x="7849673" y="843568"/>
+            <a:ext cx="4058997" cy="3767071"/>
+          </a:xfrm>
+          <a:prstGeom prst="roundRect">
+            <a:avLst/>
+          </a:prstGeom>
+          <a:solidFill>
+            <a:schemeClr val="bg1">
+              <a:lumMod val="85000"/>
+            </a:schemeClr>
+          </a:solidFill>
+          <a:ln>
+            <a:prstDash val="dash"/>
+          </a:ln>
+        </p:spPr>
+        <p:style>
+          <a:lnRef idx="2">
+            <a:schemeClr val="accent1">
+              <a:shade val="50000"/>
+            </a:schemeClr>
+          </a:lnRef>
+          <a:fillRef idx="1">
+            <a:schemeClr val="accent1"/>
+          </a:fillRef>
+          <a:effectRef idx="0">
+            <a:schemeClr val="accent1"/>
+          </a:effectRef>
+          <a:fontRef idx="minor">
+            <a:schemeClr val="lt1"/>
+          </a:fontRef>
+        </p:style>
+        <p:txBody>
+          <a:bodyPr rtlCol="0" anchor="t"/>
+          <a:lstStyle/>
+          <a:p>
+            <a:pPr algn="ctr"/>
+            <a:r>
+              <a:rPr lang="en-US" dirty="0">
+                <a:solidFill>
+                  <a:schemeClr val="tx1"/>
+                </a:solidFill>
+              </a:rPr>
+              <a:t>Tenant Application</a:t>
+            </a:r>
+          </a:p>
+        </p:txBody>
+      </p:sp>
+      <p:grpSp>
+        <p:nvGrpSpPr>
+          <p:cNvPr id="13" name="Group 12"/>
+          <p:cNvGrpSpPr/>
+          <p:nvPr/>
+        </p:nvGrpSpPr>
+        <p:grpSpPr>
+          <a:xfrm>
+            <a:off x="8062181" y="1376566"/>
+            <a:ext cx="3653308" cy="878721"/>
+            <a:chOff x="5825543" y="2187932"/>
+            <a:chExt cx="3653308" cy="878721"/>
+          </a:xfrm>
+        </p:grpSpPr>
+        <p:sp>
+          <p:nvSpPr>
+            <p:cNvPr id="14" name="Rectangle 13"/>
+            <p:cNvSpPr/>
+            <p:nvPr/>
+          </p:nvSpPr>
+          <p:spPr>
+            <a:xfrm>
+              <a:off x="5825543" y="2187932"/>
+              <a:ext cx="3653308" cy="878721"/>
+            </a:xfrm>
+            <a:prstGeom prst="rect">
+              <a:avLst/>
+            </a:prstGeom>
+          </p:spPr>
+          <p:style>
+            <a:lnRef idx="2">
+              <a:schemeClr val="accent1">
+                <a:shade val="50000"/>
+              </a:schemeClr>
+            </a:lnRef>
+            <a:fillRef idx="1">
+              <a:schemeClr val="accent1"/>
+            </a:fillRef>
+            <a:effectRef idx="0">
+              <a:schemeClr val="accent1"/>
+            </a:effectRef>
+            <a:fontRef idx="minor">
+              <a:schemeClr val="lt1"/>
+            </a:fontRef>
+          </p:style>
+          <p:txBody>
+            <a:bodyPr rtlCol="0" anchor="t"/>
+            <a:lstStyle/>
+            <a:p>
+              <a:r>
+                <a:rPr lang="en-US" dirty="0"/>
+                <a:t>Administration Service</a:t>
+              </a:r>
+            </a:p>
+          </p:txBody>
+        </p:sp>
+        <p:sp>
+          <p:nvSpPr>
+            <p:cNvPr id="15" name="Cylinder 14"/>
+            <p:cNvSpPr/>
+            <p:nvPr/>
+          </p:nvSpPr>
+          <p:spPr>
+            <a:xfrm>
+              <a:off x="7371006" y="2471944"/>
+              <a:ext cx="2067059" cy="534473"/>
+            </a:xfrm>
+            <a:prstGeom prst="can">
+              <a:avLst/>
+            </a:prstGeom>
+            <a:solidFill>
+              <a:schemeClr val="tx2">
+                <a:lumMod val="60000"/>
+                <a:lumOff val="40000"/>
+              </a:schemeClr>
+            </a:solidFill>
+          </p:spPr>
+          <p:style>
+            <a:lnRef idx="2">
+              <a:schemeClr val="accent1">
+                <a:shade val="50000"/>
+              </a:schemeClr>
+            </a:lnRef>
+            <a:fillRef idx="1">
+              <a:schemeClr val="accent1"/>
+            </a:fillRef>
+            <a:effectRef idx="0">
+              <a:schemeClr val="accent1"/>
+            </a:effectRef>
+            <a:fontRef idx="minor">
+              <a:schemeClr val="lt1"/>
+            </a:fontRef>
+          </p:style>
+          <p:txBody>
+            <a:bodyPr rtlCol="0" anchor="ctr"/>
+            <a:lstStyle/>
+            <a:p>
+              <a:pPr algn="ctr"/>
+              <a:r>
+                <a:rPr lang="en-US" sz="1200" dirty="0">
+                  <a:solidFill>
+                    <a:schemeClr val="tx1"/>
+                  </a:solidFill>
+                </a:rPr>
+                <a:t>Tenant Property Bag</a:t>
+              </a:r>
+            </a:p>
+            <a:p>
+              <a:pPr algn="ctr"/>
+              <a:r>
+                <a:rPr lang="en-US" sz="1200" dirty="0">
+                  <a:solidFill>
+                    <a:schemeClr val="tx1"/>
+                  </a:solidFill>
+                </a:rPr>
+                <a:t>(reliable Dictionary)</a:t>
+              </a:r>
+            </a:p>
+          </p:txBody>
+        </p:sp>
+      </p:grpSp>
+      <p:sp>
+        <p:nvSpPr>
+          <p:cNvPr id="19" name="Rectangle 18"/>
+          <p:cNvSpPr/>
+          <p:nvPr/>
+        </p:nvSpPr>
+        <p:spPr>
+          <a:xfrm>
+            <a:off x="4286037" y="2836302"/>
+            <a:ext cx="1680693" cy="530180"/>
+          </a:xfrm>
+          <a:prstGeom prst="rect">
+            <a:avLst/>
+          </a:prstGeom>
+        </p:spPr>
+        <p:style>
+          <a:lnRef idx="2">
+            <a:schemeClr val="accent1">
+              <a:shade val="50000"/>
+            </a:schemeClr>
+          </a:lnRef>
+          <a:fillRef idx="1">
+            <a:schemeClr val="accent1"/>
+          </a:fillRef>
+          <a:effectRef idx="0">
+            <a:schemeClr val="accent1"/>
+          </a:effectRef>
+          <a:fontRef idx="minor">
+            <a:schemeClr val="lt1"/>
+          </a:fontRef>
+        </p:style>
+        <p:txBody>
+          <a:bodyPr rtlCol="0" anchor="ctr"/>
+          <a:lstStyle/>
+          <a:p>
+            <a:pPr algn="ctr"/>
+            <a:r>
+              <a:rPr lang="en-US" dirty="0"/>
+              <a:t>Admin Service</a:t>
+            </a:r>
+          </a:p>
+        </p:txBody>
+      </p:sp>
+      <p:sp>
+        <p:nvSpPr>
+          <p:cNvPr id="20" name="Arrow: Right 19"/>
+          <p:cNvSpPr/>
+          <p:nvPr/>
+        </p:nvSpPr>
+        <p:spPr>
+          <a:xfrm>
+            <a:off x="1842796" y="2836302"/>
+            <a:ext cx="2391923" cy="484632"/>
+          </a:xfrm>
+          <a:prstGeom prst="rightArrow">
+            <a:avLst/>
+          </a:prstGeom>
+        </p:spPr>
+        <p:style>
+          <a:lnRef idx="2">
+            <a:schemeClr val="accent1">
+              <a:shade val="50000"/>
+            </a:schemeClr>
+          </a:lnRef>
+          <a:fillRef idx="1">
+            <a:schemeClr val="accent1"/>
+          </a:fillRef>
+          <a:effectRef idx="0">
+            <a:schemeClr val="accent1"/>
+          </a:effectRef>
+          <a:fontRef idx="minor">
+            <a:schemeClr val="lt1"/>
+          </a:fontRef>
+        </p:style>
+        <p:txBody>
+          <a:bodyPr rtlCol="0" anchor="ctr"/>
+          <a:lstStyle/>
+          <a:p>
+            <a:pPr algn="ctr"/>
+            <a:r>
+              <a:rPr lang="en-US" sz="1400" dirty="0"/>
+              <a:t>Post: /</a:t>
+            </a:r>
+            <a:r>
+              <a:rPr lang="en-US" sz="1400" dirty="0" err="1">
+                <a:solidFill>
+                  <a:schemeClr val="bg1"/>
+                </a:solidFill>
+              </a:rPr>
+              <a:t>api</a:t>
+            </a:r>
+            <a:r>
+              <a:rPr lang="en-US" sz="1400" dirty="0"/>
+              <a:t>/</a:t>
+            </a:r>
+            <a:r>
+              <a:rPr lang="en-US" sz="1400" dirty="0">
+                <a:solidFill>
+                  <a:schemeClr val="accent2">
+                    <a:lumMod val="60000"/>
+                    <a:lumOff val="40000"/>
+                  </a:schemeClr>
+                </a:solidFill>
+              </a:rPr>
+              <a:t>tenantId1</a:t>
+            </a:r>
+          </a:p>
+        </p:txBody>
+      </p:sp>
+      <p:sp>
+        <p:nvSpPr>
+          <p:cNvPr id="21" name="TextBox 20"/>
+          <p:cNvSpPr txBox="1"/>
+          <p:nvPr/>
+        </p:nvSpPr>
+        <p:spPr>
+          <a:xfrm>
+            <a:off x="1739405" y="2496270"/>
+            <a:ext cx="2369975" cy="461665"/>
+          </a:xfrm>
+          <a:prstGeom prst="rect">
+            <a:avLst/>
+          </a:prstGeom>
+          <a:noFill/>
+        </p:spPr>
+        <p:txBody>
+          <a:bodyPr wrap="square" rtlCol="0">
+            <a:spAutoFit/>
+          </a:bodyPr>
+          <a:lstStyle/>
+          <a:p>
+            <a:r>
+              <a:rPr lang="en-US" sz="1200" b="1" dirty="0">
+                <a:solidFill>
+                  <a:srgbClr val="FF0000"/>
+                </a:solidFill>
+              </a:rPr>
+              <a:t>3) </a:t>
+            </a:r>
+            <a:r>
+              <a:rPr lang="en-US" sz="1200" dirty="0"/>
+              <a:t>Client sends a REST API request to create a new topic </a:t>
+            </a:r>
+          </a:p>
+        </p:txBody>
+      </p:sp>
+      <p:grpSp>
+        <p:nvGrpSpPr>
+          <p:cNvPr id="22" name="Group 21"/>
+          <p:cNvGrpSpPr/>
+          <p:nvPr/>
+        </p:nvGrpSpPr>
+        <p:grpSpPr>
+          <a:xfrm>
+            <a:off x="8062181" y="2310353"/>
+            <a:ext cx="3653308" cy="1122609"/>
+            <a:chOff x="5825543" y="3307724"/>
+            <a:chExt cx="3653308" cy="1122609"/>
+          </a:xfrm>
+        </p:grpSpPr>
+        <p:sp>
+          <p:nvSpPr>
+            <p:cNvPr id="23" name="Rectangle 22"/>
+            <p:cNvSpPr/>
+            <p:nvPr/>
+          </p:nvSpPr>
+          <p:spPr>
+            <a:xfrm>
+              <a:off x="5825543" y="3307724"/>
+              <a:ext cx="3653308" cy="1122609"/>
+            </a:xfrm>
+            <a:prstGeom prst="rect">
+              <a:avLst/>
+            </a:prstGeom>
+          </p:spPr>
+          <p:style>
+            <a:lnRef idx="2">
+              <a:schemeClr val="accent1">
+                <a:shade val="50000"/>
+              </a:schemeClr>
+            </a:lnRef>
+            <a:fillRef idx="1">
+              <a:schemeClr val="accent1"/>
+            </a:fillRef>
+            <a:effectRef idx="0">
+              <a:schemeClr val="accent1"/>
+            </a:effectRef>
+            <a:fontRef idx="minor">
+              <a:schemeClr val="lt1"/>
+            </a:fontRef>
+          </p:style>
+          <p:txBody>
+            <a:bodyPr rtlCol="0" anchor="t"/>
+            <a:lstStyle/>
+            <a:p>
+              <a:r>
+                <a:rPr lang="en-US" dirty="0"/>
+                <a:t>Topic Service</a:t>
+              </a:r>
+            </a:p>
+          </p:txBody>
+        </p:sp>
+        <p:sp>
+          <p:nvSpPr>
+            <p:cNvPr id="24" name="Cylinder 23"/>
+            <p:cNvSpPr/>
+            <p:nvPr/>
+          </p:nvSpPr>
+          <p:spPr>
+            <a:xfrm>
+              <a:off x="7371008" y="3820199"/>
+              <a:ext cx="2067059" cy="534473"/>
+            </a:xfrm>
+            <a:prstGeom prst="can">
+              <a:avLst/>
+            </a:prstGeom>
+            <a:solidFill>
+              <a:schemeClr val="tx2">
+                <a:lumMod val="60000"/>
+                <a:lumOff val="40000"/>
+              </a:schemeClr>
+            </a:solidFill>
+          </p:spPr>
+          <p:style>
+            <a:lnRef idx="2">
+              <a:schemeClr val="accent1">
+                <a:shade val="50000"/>
+              </a:schemeClr>
+            </a:lnRef>
+            <a:fillRef idx="1">
+              <a:schemeClr val="accent1"/>
+            </a:fillRef>
+            <a:effectRef idx="0">
+              <a:schemeClr val="accent1"/>
+            </a:effectRef>
+            <a:fontRef idx="minor">
+              <a:schemeClr val="lt1"/>
+            </a:fontRef>
+          </p:style>
+          <p:txBody>
+            <a:bodyPr rtlCol="0" anchor="ctr"/>
+            <a:lstStyle/>
+            <a:p>
+              <a:pPr algn="ctr"/>
+              <a:r>
+                <a:rPr lang="en-US" sz="1200" dirty="0">
+                  <a:solidFill>
+                    <a:schemeClr val="tx1"/>
+                  </a:solidFill>
+                </a:rPr>
+                <a:t>Input Queue</a:t>
+              </a:r>
+            </a:p>
+            <a:p>
+              <a:pPr algn="ctr"/>
+              <a:r>
+                <a:rPr lang="en-US" sz="1200" dirty="0">
+                  <a:solidFill>
+                    <a:schemeClr val="tx1"/>
+                  </a:solidFill>
+                </a:rPr>
+                <a:t>(reliable Queue)</a:t>
+              </a:r>
+            </a:p>
+          </p:txBody>
+        </p:sp>
+        <p:sp>
+          <p:nvSpPr>
+            <p:cNvPr id="25" name="Cylinder 24"/>
+            <p:cNvSpPr/>
+            <p:nvPr/>
+          </p:nvSpPr>
+          <p:spPr>
+            <a:xfrm>
+              <a:off x="7371009" y="3351730"/>
+              <a:ext cx="2067059" cy="534473"/>
+            </a:xfrm>
+            <a:prstGeom prst="can">
+              <a:avLst/>
+            </a:prstGeom>
+            <a:solidFill>
+              <a:schemeClr val="tx2">
+                <a:lumMod val="60000"/>
+                <a:lumOff val="40000"/>
+              </a:schemeClr>
+            </a:solidFill>
+          </p:spPr>
+          <p:style>
+            <a:lnRef idx="2">
+              <a:schemeClr val="accent1">
+                <a:shade val="50000"/>
+              </a:schemeClr>
+            </a:lnRef>
+            <a:fillRef idx="1">
+              <a:schemeClr val="accent1"/>
+            </a:fillRef>
+            <a:effectRef idx="0">
+              <a:schemeClr val="accent1"/>
+            </a:effectRef>
+            <a:fontRef idx="minor">
+              <a:schemeClr val="lt1"/>
+            </a:fontRef>
+          </p:style>
+          <p:txBody>
+            <a:bodyPr rtlCol="0" anchor="ctr"/>
+            <a:lstStyle/>
+            <a:p>
+              <a:pPr algn="ctr"/>
+              <a:r>
+                <a:rPr lang="en-US" sz="1200" dirty="0">
+                  <a:solidFill>
+                    <a:schemeClr val="tx1"/>
+                  </a:solidFill>
+                </a:rPr>
+                <a:t>Topic Property Bag</a:t>
+              </a:r>
+            </a:p>
+            <a:p>
+              <a:pPr algn="ctr"/>
+              <a:r>
+                <a:rPr lang="en-US" sz="1200" dirty="0">
+                  <a:solidFill>
+                    <a:schemeClr val="tx1"/>
+                  </a:solidFill>
+                </a:rPr>
+                <a:t>(reliable Dictionary)</a:t>
+              </a:r>
+            </a:p>
+          </p:txBody>
+        </p:sp>
+      </p:grpSp>
+      <p:cxnSp>
+        <p:nvCxnSpPr>
+          <p:cNvPr id="26" name="Connector: Elbow 25"/>
+          <p:cNvCxnSpPr>
+            <a:stCxn id="19" idx="3"/>
+          </p:cNvCxnSpPr>
+          <p:nvPr/>
+        </p:nvCxnSpPr>
+        <p:spPr>
+          <a:xfrm flipV="1">
+            <a:off x="5966730" y="3100388"/>
+            <a:ext cx="1882943" cy="1004"/>
+          </a:xfrm>
+          <a:prstGeom prst="bentConnector3">
+            <a:avLst>
+              <a:gd name="adj1" fmla="val 50000"/>
+            </a:avLst>
+          </a:prstGeom>
+          <a:ln w="38100">
+            <a:headEnd type="triangle" w="med" len="med"/>
+            <a:tailEnd type="triangle" w="med" len="med"/>
+          </a:ln>
+        </p:spPr>
+        <p:style>
+          <a:lnRef idx="1">
+            <a:schemeClr val="accent1"/>
+          </a:lnRef>
+          <a:fillRef idx="0">
+            <a:schemeClr val="accent1"/>
+          </a:fillRef>
+          <a:effectRef idx="0">
+            <a:schemeClr val="accent1"/>
+          </a:effectRef>
+          <a:fontRef idx="minor">
+            <a:schemeClr val="tx1"/>
+          </a:fontRef>
+        </p:style>
+      </p:cxnSp>
+      <p:sp>
+        <p:nvSpPr>
+          <p:cNvPr id="30" name="TextBox 29"/>
+          <p:cNvSpPr txBox="1"/>
+          <p:nvPr/>
+        </p:nvSpPr>
+        <p:spPr>
+          <a:xfrm>
+            <a:off x="6080528" y="1896738"/>
+            <a:ext cx="1706286" cy="1200329"/>
+          </a:xfrm>
+          <a:prstGeom prst="rect">
+            <a:avLst/>
+          </a:prstGeom>
+          <a:noFill/>
+        </p:spPr>
+        <p:txBody>
+          <a:bodyPr wrap="square" rtlCol="0">
+            <a:spAutoFit/>
+          </a:bodyPr>
+          <a:lstStyle/>
+          <a:p>
+            <a:r>
+              <a:rPr lang="en-US" sz="1200" b="1" dirty="0">
+                <a:solidFill>
+                  <a:srgbClr val="FF0000"/>
+                </a:solidFill>
+              </a:rPr>
+              <a:t>4) </a:t>
+            </a:r>
+            <a:r>
+              <a:rPr lang="en-US" sz="1200" dirty="0"/>
+              <a:t>Admin Service authenticates request. And creates a copy of the topic service type within the tenant specific application. </a:t>
+            </a:r>
+          </a:p>
+        </p:txBody>
+      </p:sp>
+      <p:sp>
+        <p:nvSpPr>
+          <p:cNvPr id="31" name="Rectangle 30"/>
+          <p:cNvSpPr/>
+          <p:nvPr/>
+        </p:nvSpPr>
+        <p:spPr>
+          <a:xfrm>
+            <a:off x="4234719" y="4445737"/>
+            <a:ext cx="1680693" cy="530180"/>
+          </a:xfrm>
+          <a:prstGeom prst="rect">
+            <a:avLst/>
+          </a:prstGeom>
+        </p:spPr>
+        <p:style>
+          <a:lnRef idx="2">
+            <a:schemeClr val="accent1">
+              <a:shade val="50000"/>
+            </a:schemeClr>
+          </a:lnRef>
+          <a:fillRef idx="1">
+            <a:schemeClr val="accent1"/>
+          </a:fillRef>
+          <a:effectRef idx="0">
+            <a:schemeClr val="accent1"/>
+          </a:effectRef>
+          <a:fontRef idx="minor">
+            <a:schemeClr val="lt1"/>
+          </a:fontRef>
+        </p:style>
+        <p:txBody>
+          <a:bodyPr rtlCol="0" anchor="ctr"/>
+          <a:lstStyle/>
+          <a:p>
+            <a:pPr algn="ctr"/>
+            <a:r>
+              <a:rPr lang="en-US" dirty="0"/>
+              <a:t>Admin Service</a:t>
+            </a:r>
+          </a:p>
+        </p:txBody>
+      </p:sp>
+      <p:sp>
+        <p:nvSpPr>
+          <p:cNvPr id="32" name="Arrow: Right 31"/>
+          <p:cNvSpPr/>
+          <p:nvPr/>
+        </p:nvSpPr>
+        <p:spPr>
+          <a:xfrm>
+            <a:off x="1314450" y="4445737"/>
+            <a:ext cx="2868951" cy="484632"/>
+          </a:xfrm>
+          <a:prstGeom prst="rightArrow">
+            <a:avLst/>
+          </a:prstGeom>
+        </p:spPr>
+        <p:style>
+          <a:lnRef idx="2">
+            <a:schemeClr val="accent1">
+              <a:shade val="50000"/>
+            </a:schemeClr>
+          </a:lnRef>
+          <a:fillRef idx="1">
+            <a:schemeClr val="accent1"/>
+          </a:fillRef>
+          <a:effectRef idx="0">
+            <a:schemeClr val="accent1"/>
+          </a:effectRef>
+          <a:fontRef idx="minor">
+            <a:schemeClr val="lt1"/>
+          </a:fontRef>
+        </p:style>
+        <p:txBody>
+          <a:bodyPr rtlCol="0" anchor="ctr"/>
+          <a:lstStyle/>
+          <a:p>
+            <a:pPr algn="ctr"/>
+            <a:r>
+              <a:rPr lang="en-US" sz="1400" dirty="0"/>
+              <a:t>Post: /</a:t>
+            </a:r>
+            <a:r>
+              <a:rPr lang="en-US" sz="1400" dirty="0" err="1">
+                <a:solidFill>
+                  <a:schemeClr val="bg1"/>
+                </a:solidFill>
+              </a:rPr>
+              <a:t>api</a:t>
+            </a:r>
+            <a:r>
+              <a:rPr lang="en-US" sz="1400" dirty="0"/>
+              <a:t>/</a:t>
+            </a:r>
+            <a:r>
+              <a:rPr lang="en-US" sz="1400" dirty="0">
+                <a:solidFill>
+                  <a:schemeClr val="accent2">
+                    <a:lumMod val="60000"/>
+                    <a:lumOff val="40000"/>
+                  </a:schemeClr>
+                </a:solidFill>
+              </a:rPr>
+              <a:t>tenantId1</a:t>
+            </a:r>
+            <a:r>
+              <a:rPr lang="en-US" sz="1400" dirty="0"/>
+              <a:t> /</a:t>
+            </a:r>
+            <a:r>
+              <a:rPr lang="en-US" sz="1400" dirty="0" err="1">
+                <a:solidFill>
+                  <a:schemeClr val="accent6">
+                    <a:lumMod val="60000"/>
+                    <a:lumOff val="40000"/>
+                  </a:schemeClr>
+                </a:solidFill>
+              </a:rPr>
+              <a:t>topicname</a:t>
+            </a:r>
+            <a:endParaRPr lang="en-US" sz="1400" dirty="0">
+              <a:solidFill>
+                <a:schemeClr val="accent2">
+                  <a:lumMod val="60000"/>
+                  <a:lumOff val="40000"/>
+                </a:schemeClr>
+              </a:solidFill>
+            </a:endParaRPr>
+          </a:p>
+        </p:txBody>
+      </p:sp>
+      <p:sp>
+        <p:nvSpPr>
+          <p:cNvPr id="33" name="TextBox 32"/>
+          <p:cNvSpPr txBox="1"/>
+          <p:nvPr/>
+        </p:nvSpPr>
+        <p:spPr>
+          <a:xfrm>
+            <a:off x="1688087" y="3944946"/>
+            <a:ext cx="2369975" cy="646331"/>
+          </a:xfrm>
+          <a:prstGeom prst="rect">
+            <a:avLst/>
+          </a:prstGeom>
+          <a:noFill/>
+        </p:spPr>
+        <p:txBody>
+          <a:bodyPr wrap="square" rtlCol="0">
+            <a:spAutoFit/>
+          </a:bodyPr>
+          <a:lstStyle/>
+          <a:p>
+            <a:r>
+              <a:rPr lang="en-US" sz="1200" b="1" dirty="0">
+                <a:solidFill>
+                  <a:srgbClr val="FF0000"/>
+                </a:solidFill>
+              </a:rPr>
+              <a:t>5) </a:t>
+            </a:r>
+            <a:r>
+              <a:rPr lang="en-US" sz="1200" dirty="0"/>
+              <a:t>Client sends a REST API request to create a new subscriber on a topic</a:t>
+            </a:r>
+          </a:p>
+        </p:txBody>
+      </p:sp>
+      <p:cxnSp>
+        <p:nvCxnSpPr>
+          <p:cNvPr id="34" name="Connector: Elbow 33"/>
+          <p:cNvCxnSpPr>
+            <a:stCxn id="31" idx="3"/>
+          </p:cNvCxnSpPr>
+          <p:nvPr/>
+        </p:nvCxnSpPr>
+        <p:spPr>
+          <a:xfrm flipV="1">
+            <a:off x="5915412" y="4709823"/>
+            <a:ext cx="1882943" cy="1004"/>
+          </a:xfrm>
+          <a:prstGeom prst="bentConnector3">
+            <a:avLst>
+              <a:gd name="adj1" fmla="val 50000"/>
+            </a:avLst>
+          </a:prstGeom>
+          <a:ln w="38100">
+            <a:headEnd type="triangle" w="med" len="med"/>
+            <a:tailEnd type="triangle" w="med" len="med"/>
+          </a:ln>
+        </p:spPr>
+        <p:style>
+          <a:lnRef idx="1">
+            <a:schemeClr val="accent1"/>
+          </a:lnRef>
+          <a:fillRef idx="0">
+            <a:schemeClr val="accent1"/>
+          </a:fillRef>
+          <a:effectRef idx="0">
+            <a:schemeClr val="accent1"/>
+          </a:effectRef>
+          <a:fontRef idx="minor">
+            <a:schemeClr val="tx1"/>
+          </a:fontRef>
+        </p:style>
+      </p:cxnSp>
+      <p:sp>
+        <p:nvSpPr>
+          <p:cNvPr id="35" name="TextBox 34"/>
+          <p:cNvSpPr txBox="1"/>
+          <p:nvPr/>
+        </p:nvSpPr>
+        <p:spPr>
+          <a:xfrm>
+            <a:off x="6055058" y="4734342"/>
+            <a:ext cx="4054142" cy="1015663"/>
+          </a:xfrm>
+          <a:prstGeom prst="rect">
+            <a:avLst/>
+          </a:prstGeom>
+          <a:noFill/>
+        </p:spPr>
+        <p:txBody>
+          <a:bodyPr wrap="square" rtlCol="0">
+            <a:spAutoFit/>
+          </a:bodyPr>
+          <a:lstStyle/>
+          <a:p>
+            <a:r>
+              <a:rPr lang="en-US" sz="1200" b="1" dirty="0">
+                <a:solidFill>
+                  <a:srgbClr val="FF0000"/>
+                </a:solidFill>
+              </a:rPr>
+              <a:t>6) </a:t>
+            </a:r>
+            <a:r>
+              <a:rPr lang="en-US" sz="1200" dirty="0"/>
+              <a:t>Admin Service authenticates request. And creates a copy of the subscription service type within the tenant specific application. This new subscriber is then also added to the list of topic subscribers contained in the topic service’s property bag.</a:t>
+            </a:r>
+          </a:p>
+        </p:txBody>
+      </p:sp>
+      <p:grpSp>
+        <p:nvGrpSpPr>
+          <p:cNvPr id="39" name="Group 38"/>
+          <p:cNvGrpSpPr/>
+          <p:nvPr/>
+        </p:nvGrpSpPr>
+        <p:grpSpPr>
+          <a:xfrm>
+            <a:off x="8062180" y="3487050"/>
+            <a:ext cx="3653309" cy="861407"/>
+            <a:chOff x="5825542" y="4325897"/>
+            <a:chExt cx="3653309" cy="861407"/>
+          </a:xfrm>
+        </p:grpSpPr>
+        <p:sp>
+          <p:nvSpPr>
+            <p:cNvPr id="40" name="Rectangle 39"/>
+            <p:cNvSpPr/>
+            <p:nvPr/>
+          </p:nvSpPr>
+          <p:spPr>
+            <a:xfrm>
+              <a:off x="5825542" y="4325897"/>
+              <a:ext cx="3653309" cy="861407"/>
+            </a:xfrm>
+            <a:prstGeom prst="rect">
+              <a:avLst/>
+            </a:prstGeom>
+          </p:spPr>
+          <p:style>
+            <a:lnRef idx="2">
+              <a:schemeClr val="accent1">
+                <a:shade val="50000"/>
+              </a:schemeClr>
+            </a:lnRef>
+            <a:fillRef idx="1">
+              <a:schemeClr val="accent1"/>
+            </a:fillRef>
+            <a:effectRef idx="0">
+              <a:schemeClr val="accent1"/>
+            </a:effectRef>
+            <a:fontRef idx="minor">
+              <a:schemeClr val="lt1"/>
+            </a:fontRef>
+          </p:style>
+          <p:txBody>
+            <a:bodyPr rtlCol="0" anchor="t"/>
+            <a:lstStyle/>
+            <a:p>
+              <a:r>
+                <a:rPr lang="en-US" dirty="0"/>
+                <a:t>Subscriber Service</a:t>
+              </a:r>
+            </a:p>
+          </p:txBody>
+        </p:sp>
+        <p:sp>
+          <p:nvSpPr>
+            <p:cNvPr id="41" name="Cylinder 40"/>
+            <p:cNvSpPr/>
+            <p:nvPr/>
+          </p:nvSpPr>
+          <p:spPr>
+            <a:xfrm>
+              <a:off x="7371007" y="4599909"/>
+              <a:ext cx="2067059" cy="534473"/>
+            </a:xfrm>
+            <a:prstGeom prst="can">
+              <a:avLst/>
+            </a:prstGeom>
+            <a:solidFill>
+              <a:schemeClr val="tx2">
+                <a:lumMod val="60000"/>
+                <a:lumOff val="40000"/>
+              </a:schemeClr>
+            </a:solidFill>
+          </p:spPr>
+          <p:style>
+            <a:lnRef idx="2">
+              <a:schemeClr val="accent1">
+                <a:shade val="50000"/>
+              </a:schemeClr>
+            </a:lnRef>
+            <a:fillRef idx="1">
+              <a:schemeClr val="accent1"/>
+            </a:fillRef>
+            <a:effectRef idx="0">
+              <a:schemeClr val="accent1"/>
+            </a:effectRef>
+            <a:fontRef idx="minor">
+              <a:schemeClr val="lt1"/>
+            </a:fontRef>
+          </p:style>
+          <p:txBody>
+            <a:bodyPr rtlCol="0" anchor="ctr"/>
+            <a:lstStyle/>
+            <a:p>
+              <a:pPr algn="ctr"/>
+              <a:r>
+                <a:rPr lang="en-US" sz="1200" dirty="0">
+                  <a:solidFill>
+                    <a:schemeClr val="tx1"/>
+                  </a:solidFill>
+                </a:rPr>
+                <a:t>Output Queue</a:t>
+              </a:r>
+            </a:p>
+            <a:p>
+              <a:pPr algn="ctr"/>
+              <a:r>
+                <a:rPr lang="en-US" sz="1200" dirty="0">
+                  <a:solidFill>
+                    <a:schemeClr val="tx1"/>
+                  </a:solidFill>
+                </a:rPr>
+                <a:t>(reliable Queue)</a:t>
+              </a:r>
+            </a:p>
+          </p:txBody>
+        </p:sp>
+      </p:grpSp>
+    </p:spTree>
+    <p:extLst>
+      <p:ext uri="{BB962C8B-B14F-4D97-AF65-F5344CB8AC3E}">
+        <p14:creationId xmlns:p14="http://schemas.microsoft.com/office/powerpoint/2010/main" val="1037522336"/>
+      </p:ext>
+    </p:extLst>
+  </p:cSld>
+  <p:clrMapOvr>
+    <a:masterClrMapping/>
+  </p:clrMapOvr>
+</p:sld>
+</file>
+
 <file path=ppt/theme/theme1.xml><?xml version="1.0" encoding="utf-8"?>
 <a:theme xmlns:a="http://schemas.openxmlformats.org/drawingml/2006/main" name="Office Theme">
   <a:themeElements>

</xml_diff>

<commit_message>
update overview desk with explanation of topic and subscriber workflow
</commit_message>
<xml_diff>
--- a/overview.pptx
+++ b/overview.pptx
@@ -7,7 +7,8 @@
   <p:sldIdLst>
     <p:sldId id="256" r:id="rId2"/>
     <p:sldId id="257" r:id="rId3"/>
-    <p:sldId id="258" r:id="rId4"/>
+    <p:sldId id="259" r:id="rId4"/>
+    <p:sldId id="258" r:id="rId5"/>
   </p:sldIdLst>
   <p:sldSz cx="12192000" cy="6858000"/>
   <p:notesSz cx="6858000" cy="9144000"/>
@@ -247,7 +248,7 @@
           <a:p>
             <a:fld id="{49757FAF-5228-43FF-9B16-6D8B7CFFD72C}" type="datetimeFigureOut">
               <a:rPr lang="en-US" smtClean="0"/>
-              <a:t>5/15/2017</a:t>
+              <a:t>5/16/2017</a:t>
             </a:fld>
             <a:endParaRPr lang="en-US"/>
           </a:p>
@@ -415,7 +416,7 @@
           <a:p>
             <a:fld id="{49757FAF-5228-43FF-9B16-6D8B7CFFD72C}" type="datetimeFigureOut">
               <a:rPr lang="en-US" smtClean="0"/>
-              <a:t>5/15/2017</a:t>
+              <a:t>5/16/2017</a:t>
             </a:fld>
             <a:endParaRPr lang="en-US"/>
           </a:p>
@@ -593,7 +594,7 @@
           <a:p>
             <a:fld id="{49757FAF-5228-43FF-9B16-6D8B7CFFD72C}" type="datetimeFigureOut">
               <a:rPr lang="en-US" smtClean="0"/>
-              <a:t>5/15/2017</a:t>
+              <a:t>5/16/2017</a:t>
             </a:fld>
             <a:endParaRPr lang="en-US"/>
           </a:p>
@@ -761,7 +762,7 @@
           <a:p>
             <a:fld id="{49757FAF-5228-43FF-9B16-6D8B7CFFD72C}" type="datetimeFigureOut">
               <a:rPr lang="en-US" smtClean="0"/>
-              <a:t>5/15/2017</a:t>
+              <a:t>5/16/2017</a:t>
             </a:fld>
             <a:endParaRPr lang="en-US"/>
           </a:p>
@@ -1006,7 +1007,7 @@
           <a:p>
             <a:fld id="{49757FAF-5228-43FF-9B16-6D8B7CFFD72C}" type="datetimeFigureOut">
               <a:rPr lang="en-US" smtClean="0"/>
-              <a:t>5/15/2017</a:t>
+              <a:t>5/16/2017</a:t>
             </a:fld>
             <a:endParaRPr lang="en-US"/>
           </a:p>
@@ -1235,7 +1236,7 @@
           <a:p>
             <a:fld id="{49757FAF-5228-43FF-9B16-6D8B7CFFD72C}" type="datetimeFigureOut">
               <a:rPr lang="en-US" smtClean="0"/>
-              <a:t>5/15/2017</a:t>
+              <a:t>5/16/2017</a:t>
             </a:fld>
             <a:endParaRPr lang="en-US"/>
           </a:p>
@@ -1599,7 +1600,7 @@
           <a:p>
             <a:fld id="{49757FAF-5228-43FF-9B16-6D8B7CFFD72C}" type="datetimeFigureOut">
               <a:rPr lang="en-US" smtClean="0"/>
-              <a:t>5/15/2017</a:t>
+              <a:t>5/16/2017</a:t>
             </a:fld>
             <a:endParaRPr lang="en-US"/>
           </a:p>
@@ -1716,7 +1717,7 @@
           <a:p>
             <a:fld id="{49757FAF-5228-43FF-9B16-6D8B7CFFD72C}" type="datetimeFigureOut">
               <a:rPr lang="en-US" smtClean="0"/>
-              <a:t>5/15/2017</a:t>
+              <a:t>5/16/2017</a:t>
             </a:fld>
             <a:endParaRPr lang="en-US"/>
           </a:p>
@@ -1811,7 +1812,7 @@
           <a:p>
             <a:fld id="{49757FAF-5228-43FF-9B16-6D8B7CFFD72C}" type="datetimeFigureOut">
               <a:rPr lang="en-US" smtClean="0"/>
-              <a:t>5/15/2017</a:t>
+              <a:t>5/16/2017</a:t>
             </a:fld>
             <a:endParaRPr lang="en-US"/>
           </a:p>
@@ -2086,7 +2087,7 @@
           <a:p>
             <a:fld id="{49757FAF-5228-43FF-9B16-6D8B7CFFD72C}" type="datetimeFigureOut">
               <a:rPr lang="en-US" smtClean="0"/>
-              <a:t>5/15/2017</a:t>
+              <a:t>5/16/2017</a:t>
             </a:fld>
             <a:endParaRPr lang="en-US"/>
           </a:p>
@@ -2338,7 +2339,7 @@
           <a:p>
             <a:fld id="{49757FAF-5228-43FF-9B16-6D8B7CFFD72C}" type="datetimeFigureOut">
               <a:rPr lang="en-US" smtClean="0"/>
-              <a:t>5/15/2017</a:t>
+              <a:t>5/16/2017</a:t>
             </a:fld>
             <a:endParaRPr lang="en-US"/>
           </a:p>
@@ -2549,7 +2550,7 @@
           <a:p>
             <a:fld id="{49757FAF-5228-43FF-9B16-6D8B7CFFD72C}" type="datetimeFigureOut">
               <a:rPr lang="en-US" smtClean="0"/>
-              <a:t>5/15/2017</a:t>
+              <a:t>5/16/2017</a:t>
             </a:fld>
             <a:endParaRPr lang="en-US"/>
           </a:p>
@@ -5027,6 +5028,1013 @@
 </file>
 
 <file path=ppt/slides/slide3.xml><?xml version="1.0" encoding="utf-8"?>
+<p:sld xmlns:a="http://schemas.openxmlformats.org/drawingml/2006/main" xmlns:r="http://schemas.openxmlformats.org/officeDocument/2006/relationships" xmlns:p="http://schemas.openxmlformats.org/presentationml/2006/main">
+  <p:cSld>
+    <p:spTree>
+      <p:nvGrpSpPr>
+        <p:cNvPr id="1" name=""/>
+        <p:cNvGrpSpPr/>
+        <p:nvPr/>
+      </p:nvGrpSpPr>
+      <p:grpSpPr>
+        <a:xfrm>
+          <a:off x="0" y="0"/>
+          <a:ext cx="0" cy="0"/>
+          <a:chOff x="0" y="0"/>
+          <a:chExt cx="0" cy="0"/>
+        </a:xfrm>
+      </p:grpSpPr>
+      <p:sp>
+        <p:nvSpPr>
+          <p:cNvPr id="2" name="Title 1"/>
+          <p:cNvSpPr>
+            <a:spLocks noGrp="1"/>
+          </p:cNvSpPr>
+          <p:nvPr>
+            <p:ph type="title"/>
+          </p:nvPr>
+        </p:nvSpPr>
+        <p:spPr>
+          <a:xfrm>
+            <a:off x="838200" y="365126"/>
+            <a:ext cx="10515600" cy="530614"/>
+          </a:xfrm>
+        </p:spPr>
+        <p:txBody>
+          <a:bodyPr>
+            <a:normAutofit fontScale="90000"/>
+          </a:bodyPr>
+          <a:lstStyle/>
+          <a:p>
+            <a:r>
+              <a:rPr lang="en-US" dirty="0"/>
+              <a:t>Replication Approach</a:t>
+            </a:r>
+          </a:p>
+        </p:txBody>
+      </p:sp>
+      <p:sp>
+        <p:nvSpPr>
+          <p:cNvPr id="46" name="Oval 45"/>
+          <p:cNvSpPr/>
+          <p:nvPr/>
+        </p:nvSpPr>
+        <p:spPr>
+          <a:xfrm>
+            <a:off x="5588553" y="885898"/>
+            <a:ext cx="1679511" cy="914400"/>
+          </a:xfrm>
+          <a:prstGeom prst="ellipse">
+            <a:avLst/>
+          </a:prstGeom>
+        </p:spPr>
+        <p:style>
+          <a:lnRef idx="2">
+            <a:schemeClr val="accent1">
+              <a:shade val="50000"/>
+            </a:schemeClr>
+          </a:lnRef>
+          <a:fillRef idx="1">
+            <a:schemeClr val="accent1"/>
+          </a:fillRef>
+          <a:effectRef idx="0">
+            <a:schemeClr val="accent1"/>
+          </a:effectRef>
+          <a:fontRef idx="minor">
+            <a:schemeClr val="lt1"/>
+          </a:fontRef>
+        </p:style>
+        <p:txBody>
+          <a:bodyPr rtlCol="0" anchor="ctr"/>
+          <a:lstStyle/>
+          <a:p>
+            <a:pPr algn="ctr"/>
+            <a:r>
+              <a:rPr lang="en-US" dirty="0"/>
+              <a:t>Routing Services</a:t>
+            </a:r>
+          </a:p>
+        </p:txBody>
+      </p:sp>
+      <p:cxnSp>
+        <p:nvCxnSpPr>
+          <p:cNvPr id="47" name="Connector: Elbow 46"/>
+          <p:cNvCxnSpPr>
+            <a:stCxn id="46" idx="4"/>
+            <a:endCxn id="30" idx="4"/>
+          </p:cNvCxnSpPr>
+          <p:nvPr/>
+        </p:nvCxnSpPr>
+        <p:spPr>
+          <a:xfrm rot="5400000">
+            <a:off x="5265921" y="1268418"/>
+            <a:ext cx="630508" cy="1694269"/>
+          </a:xfrm>
+          <a:prstGeom prst="bentConnector2">
+            <a:avLst/>
+          </a:prstGeom>
+          <a:ln w="38100">
+            <a:headEnd type="none" w="med" len="med"/>
+            <a:tailEnd type="arrow" w="med" len="med"/>
+          </a:ln>
+        </p:spPr>
+        <p:style>
+          <a:lnRef idx="1">
+            <a:schemeClr val="accent1"/>
+          </a:lnRef>
+          <a:fillRef idx="0">
+            <a:schemeClr val="accent1"/>
+          </a:fillRef>
+          <a:effectRef idx="0">
+            <a:schemeClr val="accent1"/>
+          </a:effectRef>
+          <a:fontRef idx="minor">
+            <a:schemeClr val="tx1"/>
+          </a:fontRef>
+        </p:style>
+      </p:cxnSp>
+      <p:cxnSp>
+        <p:nvCxnSpPr>
+          <p:cNvPr id="50" name="Connector: Elbow 49"/>
+          <p:cNvCxnSpPr>
+            <a:stCxn id="44" idx="1"/>
+            <a:endCxn id="39" idx="4"/>
+          </p:cNvCxnSpPr>
+          <p:nvPr/>
+        </p:nvCxnSpPr>
+        <p:spPr>
+          <a:xfrm rot="10800000" flipV="1">
+            <a:off x="4719132" y="3252044"/>
+            <a:ext cx="2873063" cy="872"/>
+          </a:xfrm>
+          <a:prstGeom prst="bentConnector3">
+            <a:avLst>
+              <a:gd name="adj1" fmla="val 50000"/>
+            </a:avLst>
+          </a:prstGeom>
+          <a:ln w="38100">
+            <a:headEnd type="none" w="med" len="med"/>
+            <a:tailEnd type="arrow" w="med" len="med"/>
+          </a:ln>
+        </p:spPr>
+        <p:style>
+          <a:lnRef idx="1">
+            <a:schemeClr val="accent1"/>
+          </a:lnRef>
+          <a:fillRef idx="0">
+            <a:schemeClr val="accent1"/>
+          </a:fillRef>
+          <a:effectRef idx="0">
+            <a:schemeClr val="accent1"/>
+          </a:effectRef>
+          <a:fontRef idx="minor">
+            <a:schemeClr val="tx1"/>
+          </a:fontRef>
+        </p:style>
+      </p:cxnSp>
+      <p:grpSp>
+        <p:nvGrpSpPr>
+          <p:cNvPr id="54" name="Group 53"/>
+          <p:cNvGrpSpPr/>
+          <p:nvPr/>
+        </p:nvGrpSpPr>
+        <p:grpSpPr>
+          <a:xfrm>
+            <a:off x="7592194" y="2821340"/>
+            <a:ext cx="3653309" cy="861407"/>
+            <a:chOff x="7666738" y="1934096"/>
+            <a:chExt cx="3653309" cy="861407"/>
+          </a:xfrm>
+        </p:grpSpPr>
+        <p:grpSp>
+          <p:nvGrpSpPr>
+            <p:cNvPr id="43" name="Group 42"/>
+            <p:cNvGrpSpPr/>
+            <p:nvPr/>
+          </p:nvGrpSpPr>
+          <p:grpSpPr>
+            <a:xfrm>
+              <a:off x="7666738" y="1934096"/>
+              <a:ext cx="3653309" cy="861407"/>
+              <a:chOff x="5825542" y="4325897"/>
+              <a:chExt cx="3653309" cy="861407"/>
+            </a:xfrm>
+          </p:grpSpPr>
+          <p:sp>
+            <p:nvSpPr>
+              <p:cNvPr id="44" name="Rectangle 43"/>
+              <p:cNvSpPr/>
+              <p:nvPr/>
+            </p:nvSpPr>
+            <p:spPr>
+              <a:xfrm>
+                <a:off x="5825542" y="4325897"/>
+                <a:ext cx="3653309" cy="861407"/>
+              </a:xfrm>
+              <a:prstGeom prst="rect">
+                <a:avLst/>
+              </a:prstGeom>
+            </p:spPr>
+            <p:style>
+              <a:lnRef idx="2">
+                <a:schemeClr val="accent1">
+                  <a:shade val="50000"/>
+                </a:schemeClr>
+              </a:lnRef>
+              <a:fillRef idx="1">
+                <a:schemeClr val="accent1"/>
+              </a:fillRef>
+              <a:effectRef idx="0">
+                <a:schemeClr val="accent1"/>
+              </a:effectRef>
+              <a:fontRef idx="minor">
+                <a:schemeClr val="lt1"/>
+              </a:fontRef>
+            </p:style>
+            <p:txBody>
+              <a:bodyPr rtlCol="0" anchor="t"/>
+              <a:lstStyle/>
+              <a:p>
+                <a:r>
+                  <a:rPr lang="en-US" dirty="0"/>
+                  <a:t>Subscriber Service</a:t>
+                </a:r>
+              </a:p>
+            </p:txBody>
+          </p:sp>
+          <p:sp>
+            <p:nvSpPr>
+              <p:cNvPr id="45" name="Cylinder 44"/>
+              <p:cNvSpPr/>
+              <p:nvPr/>
+            </p:nvSpPr>
+            <p:spPr>
+              <a:xfrm>
+                <a:off x="7371007" y="4599909"/>
+                <a:ext cx="2067059" cy="534473"/>
+              </a:xfrm>
+              <a:prstGeom prst="can">
+                <a:avLst/>
+              </a:prstGeom>
+              <a:solidFill>
+                <a:schemeClr val="tx2">
+                  <a:lumMod val="60000"/>
+                  <a:lumOff val="40000"/>
+                </a:schemeClr>
+              </a:solidFill>
+            </p:spPr>
+            <p:style>
+              <a:lnRef idx="2">
+                <a:schemeClr val="accent1">
+                  <a:shade val="50000"/>
+                </a:schemeClr>
+              </a:lnRef>
+              <a:fillRef idx="1">
+                <a:schemeClr val="accent1"/>
+              </a:fillRef>
+              <a:effectRef idx="0">
+                <a:schemeClr val="accent1"/>
+              </a:effectRef>
+              <a:fontRef idx="minor">
+                <a:schemeClr val="lt1"/>
+              </a:fontRef>
+            </p:style>
+            <p:txBody>
+              <a:bodyPr rtlCol="0" anchor="ctr"/>
+              <a:lstStyle/>
+              <a:p>
+                <a:pPr algn="ctr"/>
+                <a:r>
+                  <a:rPr lang="en-US" sz="1200" dirty="0">
+                    <a:solidFill>
+                      <a:schemeClr val="tx1"/>
+                    </a:solidFill>
+                  </a:rPr>
+                  <a:t>Output Queue</a:t>
+                </a:r>
+              </a:p>
+              <a:p>
+                <a:pPr algn="ctr"/>
+                <a:r>
+                  <a:rPr lang="en-US" sz="1200" dirty="0">
+                    <a:solidFill>
+                      <a:schemeClr val="tx1"/>
+                    </a:solidFill>
+                  </a:rPr>
+                  <a:t>(reliable Queue)</a:t>
+                </a:r>
+              </a:p>
+            </p:txBody>
+          </p:sp>
+        </p:grpSp>
+        <p:sp>
+          <p:nvSpPr>
+            <p:cNvPr id="22" name="Oval 21"/>
+            <p:cNvSpPr/>
+            <p:nvPr/>
+          </p:nvSpPr>
+          <p:spPr>
+            <a:xfrm>
+              <a:off x="7936394" y="2292995"/>
+              <a:ext cx="1152941" cy="364697"/>
+            </a:xfrm>
+            <a:prstGeom prst="ellipse">
+              <a:avLst/>
+            </a:prstGeom>
+            <a:solidFill>
+              <a:schemeClr val="bg1"/>
+            </a:solidFill>
+          </p:spPr>
+          <p:style>
+            <a:lnRef idx="2">
+              <a:schemeClr val="accent1">
+                <a:shade val="50000"/>
+              </a:schemeClr>
+            </a:lnRef>
+            <a:fillRef idx="1">
+              <a:schemeClr val="accent1"/>
+            </a:fillRef>
+            <a:effectRef idx="0">
+              <a:schemeClr val="accent1"/>
+            </a:effectRef>
+            <a:fontRef idx="minor">
+              <a:schemeClr val="lt1"/>
+            </a:fontRef>
+          </p:style>
+          <p:txBody>
+            <a:bodyPr rtlCol="0" anchor="ctr"/>
+            <a:lstStyle/>
+            <a:p>
+              <a:pPr algn="ctr"/>
+              <a:r>
+                <a:rPr lang="en-US" sz="1100" dirty="0">
+                  <a:solidFill>
+                    <a:schemeClr val="tx1"/>
+                  </a:solidFill>
+                </a:rPr>
+                <a:t>Last Message</a:t>
+              </a:r>
+            </a:p>
+          </p:txBody>
+        </p:sp>
+      </p:grpSp>
+      <p:sp>
+        <p:nvSpPr>
+          <p:cNvPr id="55" name="TextBox 54"/>
+          <p:cNvSpPr txBox="1"/>
+          <p:nvPr/>
+        </p:nvSpPr>
+        <p:spPr>
+          <a:xfrm>
+            <a:off x="6622222" y="1885820"/>
+            <a:ext cx="3086467" cy="461665"/>
+          </a:xfrm>
+          <a:prstGeom prst="rect">
+            <a:avLst/>
+          </a:prstGeom>
+          <a:noFill/>
+        </p:spPr>
+        <p:txBody>
+          <a:bodyPr wrap="square" rtlCol="0">
+            <a:spAutoFit/>
+          </a:bodyPr>
+          <a:lstStyle/>
+          <a:p>
+            <a:r>
+              <a:rPr lang="en-US" sz="1200" b="1" dirty="0">
+                <a:solidFill>
+                  <a:srgbClr val="FF0000"/>
+                </a:solidFill>
+              </a:rPr>
+              <a:t>1) </a:t>
+            </a:r>
+            <a:r>
+              <a:rPr lang="en-US" sz="1200" dirty="0"/>
+              <a:t>A message is published to the topic from the routing services </a:t>
+            </a:r>
+          </a:p>
+        </p:txBody>
+      </p:sp>
+      <p:grpSp>
+        <p:nvGrpSpPr>
+          <p:cNvPr id="61" name="Group 60"/>
+          <p:cNvGrpSpPr/>
+          <p:nvPr/>
+        </p:nvGrpSpPr>
+        <p:grpSpPr>
+          <a:xfrm>
+            <a:off x="352839" y="1608696"/>
+            <a:ext cx="4421985" cy="2789370"/>
+            <a:chOff x="352839" y="1608696"/>
+            <a:chExt cx="4421985" cy="2789370"/>
+          </a:xfrm>
+        </p:grpSpPr>
+        <p:grpSp>
+          <p:nvGrpSpPr>
+            <p:cNvPr id="57" name="Group 56"/>
+            <p:cNvGrpSpPr/>
+            <p:nvPr/>
+          </p:nvGrpSpPr>
+          <p:grpSpPr>
+            <a:xfrm>
+              <a:off x="352839" y="1608696"/>
+              <a:ext cx="4421985" cy="2789370"/>
+              <a:chOff x="-271365" y="1608696"/>
+              <a:chExt cx="4421985" cy="2789370"/>
+            </a:xfrm>
+          </p:grpSpPr>
+          <p:grpSp>
+            <p:nvGrpSpPr>
+              <p:cNvPr id="27" name="Group 26"/>
+              <p:cNvGrpSpPr/>
+              <p:nvPr/>
+            </p:nvGrpSpPr>
+            <p:grpSpPr>
+              <a:xfrm>
+                <a:off x="-271365" y="1608696"/>
+                <a:ext cx="4421985" cy="2789370"/>
+                <a:chOff x="5056866" y="3265326"/>
+                <a:chExt cx="4421985" cy="2789370"/>
+              </a:xfrm>
+            </p:grpSpPr>
+            <p:sp>
+              <p:nvSpPr>
+                <p:cNvPr id="29" name="Rectangle 28"/>
+                <p:cNvSpPr/>
+                <p:nvPr/>
+              </p:nvSpPr>
+              <p:spPr>
+                <a:xfrm>
+                  <a:off x="5056866" y="3265326"/>
+                  <a:ext cx="4421985" cy="2789370"/>
+                </a:xfrm>
+                <a:prstGeom prst="rect">
+                  <a:avLst/>
+                </a:prstGeom>
+              </p:spPr>
+              <p:style>
+                <a:lnRef idx="2">
+                  <a:schemeClr val="accent1">
+                    <a:shade val="50000"/>
+                  </a:schemeClr>
+                </a:lnRef>
+                <a:fillRef idx="1">
+                  <a:schemeClr val="accent1"/>
+                </a:fillRef>
+                <a:effectRef idx="0">
+                  <a:schemeClr val="accent1"/>
+                </a:effectRef>
+                <a:fontRef idx="minor">
+                  <a:schemeClr val="lt1"/>
+                </a:fontRef>
+              </p:style>
+              <p:txBody>
+                <a:bodyPr rtlCol="0" anchor="t"/>
+                <a:lstStyle/>
+                <a:p>
+                  <a:r>
+                    <a:rPr lang="en-US" dirty="0"/>
+                    <a:t>Topic Service</a:t>
+                  </a:r>
+                </a:p>
+              </p:txBody>
+            </p:sp>
+            <p:sp>
+              <p:nvSpPr>
+                <p:cNvPr id="30" name="Cylinder 29"/>
+                <p:cNvSpPr/>
+                <p:nvPr/>
+              </p:nvSpPr>
+              <p:spPr>
+                <a:xfrm>
+                  <a:off x="7371008" y="3820199"/>
+                  <a:ext cx="2067059" cy="534473"/>
+                </a:xfrm>
+                <a:prstGeom prst="can">
+                  <a:avLst/>
+                </a:prstGeom>
+                <a:solidFill>
+                  <a:schemeClr val="tx2">
+                    <a:lumMod val="60000"/>
+                    <a:lumOff val="40000"/>
+                  </a:schemeClr>
+                </a:solidFill>
+              </p:spPr>
+              <p:style>
+                <a:lnRef idx="2">
+                  <a:schemeClr val="accent1">
+                    <a:shade val="50000"/>
+                  </a:schemeClr>
+                </a:lnRef>
+                <a:fillRef idx="1">
+                  <a:schemeClr val="accent1"/>
+                </a:fillRef>
+                <a:effectRef idx="0">
+                  <a:schemeClr val="accent1"/>
+                </a:effectRef>
+                <a:fontRef idx="minor">
+                  <a:schemeClr val="lt1"/>
+                </a:fontRef>
+              </p:style>
+              <p:txBody>
+                <a:bodyPr rtlCol="0" anchor="ctr"/>
+                <a:lstStyle/>
+                <a:p>
+                  <a:pPr algn="ctr"/>
+                  <a:r>
+                    <a:rPr lang="en-US" sz="1200" dirty="0">
+                      <a:solidFill>
+                        <a:schemeClr val="tx1"/>
+                      </a:solidFill>
+                    </a:rPr>
+                    <a:t>Input Queue</a:t>
+                  </a:r>
+                </a:p>
+                <a:p>
+                  <a:pPr algn="ctr"/>
+                  <a:r>
+                    <a:rPr lang="en-US" sz="1200" dirty="0">
+                      <a:solidFill>
+                        <a:schemeClr val="tx1"/>
+                      </a:solidFill>
+                    </a:rPr>
+                    <a:t>(reliable Queue)</a:t>
+                  </a:r>
+                </a:p>
+              </p:txBody>
+            </p:sp>
+            <p:sp>
+              <p:nvSpPr>
+                <p:cNvPr id="38" name="Cylinder 37"/>
+                <p:cNvSpPr/>
+                <p:nvPr/>
+              </p:nvSpPr>
+              <p:spPr>
+                <a:xfrm>
+                  <a:off x="7371009" y="3351730"/>
+                  <a:ext cx="2067059" cy="534473"/>
+                </a:xfrm>
+                <a:prstGeom prst="can">
+                  <a:avLst/>
+                </a:prstGeom>
+                <a:solidFill>
+                  <a:schemeClr val="tx2">
+                    <a:lumMod val="60000"/>
+                    <a:lumOff val="40000"/>
+                  </a:schemeClr>
+                </a:solidFill>
+              </p:spPr>
+              <p:style>
+                <a:lnRef idx="2">
+                  <a:schemeClr val="accent1">
+                    <a:shade val="50000"/>
+                  </a:schemeClr>
+                </a:lnRef>
+                <a:fillRef idx="1">
+                  <a:schemeClr val="accent1"/>
+                </a:fillRef>
+                <a:effectRef idx="0">
+                  <a:schemeClr val="accent1"/>
+                </a:effectRef>
+                <a:fontRef idx="minor">
+                  <a:schemeClr val="lt1"/>
+                </a:fontRef>
+              </p:style>
+              <p:txBody>
+                <a:bodyPr rtlCol="0" anchor="ctr"/>
+                <a:lstStyle/>
+                <a:p>
+                  <a:pPr algn="ctr"/>
+                  <a:r>
+                    <a:rPr lang="en-US" sz="1200" dirty="0">
+                      <a:solidFill>
+                        <a:schemeClr val="tx1"/>
+                      </a:solidFill>
+                    </a:rPr>
+                    <a:t>Topic Property Bag</a:t>
+                  </a:r>
+                </a:p>
+                <a:p>
+                  <a:pPr algn="ctr"/>
+                  <a:r>
+                    <a:rPr lang="en-US" sz="1200" dirty="0">
+                      <a:solidFill>
+                        <a:schemeClr val="tx1"/>
+                      </a:solidFill>
+                    </a:rPr>
+                    <a:t>(reliable Dictionary)</a:t>
+                  </a:r>
+                </a:p>
+              </p:txBody>
+            </p:sp>
+          </p:grpSp>
+          <p:sp>
+            <p:nvSpPr>
+              <p:cNvPr id="39" name="Cylinder 38"/>
+              <p:cNvSpPr/>
+              <p:nvPr/>
+            </p:nvSpPr>
+            <p:spPr>
+              <a:xfrm>
+                <a:off x="2027868" y="2985679"/>
+                <a:ext cx="2067059" cy="534473"/>
+              </a:xfrm>
+              <a:prstGeom prst="can">
+                <a:avLst/>
+              </a:prstGeom>
+              <a:solidFill>
+                <a:schemeClr val="tx2">
+                  <a:lumMod val="60000"/>
+                  <a:lumOff val="40000"/>
+                </a:schemeClr>
+              </a:solidFill>
+            </p:spPr>
+            <p:style>
+              <a:lnRef idx="2">
+                <a:schemeClr val="accent1">
+                  <a:shade val="50000"/>
+                </a:schemeClr>
+              </a:lnRef>
+              <a:fillRef idx="1">
+                <a:schemeClr val="accent1"/>
+              </a:fillRef>
+              <a:effectRef idx="0">
+                <a:schemeClr val="accent1"/>
+              </a:effectRef>
+              <a:fontRef idx="minor">
+                <a:schemeClr val="lt1"/>
+              </a:fontRef>
+            </p:style>
+            <p:txBody>
+              <a:bodyPr rtlCol="0" anchor="ctr"/>
+              <a:lstStyle/>
+              <a:p>
+                <a:pPr algn="ctr"/>
+                <a:r>
+                  <a:rPr lang="en-US" sz="1200" dirty="0">
+                    <a:solidFill>
+                      <a:schemeClr val="tx1"/>
+                    </a:solidFill>
+                  </a:rPr>
+                  <a:t>Subscription Queue</a:t>
+                </a:r>
+              </a:p>
+              <a:p>
+                <a:pPr algn="ctr"/>
+                <a:r>
+                  <a:rPr lang="en-US" sz="1200" dirty="0">
+                    <a:solidFill>
+                      <a:schemeClr val="tx1"/>
+                    </a:solidFill>
+                  </a:rPr>
+                  <a:t>(reliable Queue)</a:t>
+                </a:r>
+              </a:p>
+            </p:txBody>
+          </p:sp>
+          <p:sp>
+            <p:nvSpPr>
+              <p:cNvPr id="42" name="Cylinder 41"/>
+              <p:cNvSpPr/>
+              <p:nvPr/>
+            </p:nvSpPr>
+            <p:spPr>
+              <a:xfrm>
+                <a:off x="2027867" y="3712837"/>
+                <a:ext cx="2067059" cy="534473"/>
+              </a:xfrm>
+              <a:prstGeom prst="can">
+                <a:avLst/>
+              </a:prstGeom>
+              <a:solidFill>
+                <a:schemeClr val="tx2">
+                  <a:lumMod val="60000"/>
+                  <a:lumOff val="40000"/>
+                </a:schemeClr>
+              </a:solidFill>
+            </p:spPr>
+            <p:style>
+              <a:lnRef idx="2">
+                <a:schemeClr val="accent1">
+                  <a:shade val="50000"/>
+                </a:schemeClr>
+              </a:lnRef>
+              <a:fillRef idx="1">
+                <a:schemeClr val="accent1"/>
+              </a:fillRef>
+              <a:effectRef idx="0">
+                <a:schemeClr val="accent1"/>
+              </a:effectRef>
+              <a:fontRef idx="minor">
+                <a:schemeClr val="lt1"/>
+              </a:fontRef>
+            </p:style>
+            <p:txBody>
+              <a:bodyPr rtlCol="0" anchor="ctr"/>
+              <a:lstStyle/>
+              <a:p>
+                <a:pPr algn="ctr"/>
+                <a:r>
+                  <a:rPr lang="en-US" sz="1200" dirty="0">
+                    <a:solidFill>
+                      <a:schemeClr val="tx1"/>
+                    </a:solidFill>
+                  </a:rPr>
+                  <a:t>Subscription Queue</a:t>
+                </a:r>
+              </a:p>
+              <a:p>
+                <a:pPr algn="ctr"/>
+                <a:r>
+                  <a:rPr lang="en-US" sz="1200" dirty="0">
+                    <a:solidFill>
+                      <a:schemeClr val="tx1"/>
+                    </a:solidFill>
+                  </a:rPr>
+                  <a:t>(reliable Queue)</a:t>
+                </a:r>
+              </a:p>
+            </p:txBody>
+          </p:sp>
+          <p:cxnSp>
+            <p:nvCxnSpPr>
+              <p:cNvPr id="48" name="Connector: Elbow 47"/>
+              <p:cNvCxnSpPr>
+                <a:stCxn id="30" idx="2"/>
+                <a:endCxn id="39" idx="2"/>
+              </p:cNvCxnSpPr>
+              <p:nvPr/>
+            </p:nvCxnSpPr>
+            <p:spPr>
+              <a:xfrm rot="10800000" flipV="1">
+                <a:off x="2027869" y="2430806"/>
+                <a:ext cx="14909" cy="822110"/>
+              </a:xfrm>
+              <a:prstGeom prst="bentConnector3">
+                <a:avLst>
+                  <a:gd name="adj1" fmla="val 1633302"/>
+                </a:avLst>
+              </a:prstGeom>
+              <a:ln w="38100">
+                <a:solidFill>
+                  <a:schemeClr val="bg1"/>
+                </a:solidFill>
+                <a:headEnd type="none" w="med" len="med"/>
+                <a:tailEnd type="arrow" w="med" len="med"/>
+              </a:ln>
+            </p:spPr>
+            <p:style>
+              <a:lnRef idx="1">
+                <a:schemeClr val="accent1"/>
+              </a:lnRef>
+              <a:fillRef idx="0">
+                <a:schemeClr val="accent1"/>
+              </a:fillRef>
+              <a:effectRef idx="0">
+                <a:schemeClr val="accent1"/>
+              </a:effectRef>
+              <a:fontRef idx="minor">
+                <a:schemeClr val="tx1"/>
+              </a:fontRef>
+            </p:style>
+          </p:cxnSp>
+          <p:cxnSp>
+            <p:nvCxnSpPr>
+              <p:cNvPr id="49" name="Connector: Elbow 48"/>
+              <p:cNvCxnSpPr>
+                <a:stCxn id="30" idx="2"/>
+                <a:endCxn id="42" idx="2"/>
+              </p:cNvCxnSpPr>
+              <p:nvPr/>
+            </p:nvCxnSpPr>
+            <p:spPr>
+              <a:xfrm rot="10800000" flipV="1">
+                <a:off x="2027867" y="2430806"/>
+                <a:ext cx="14910" cy="1549268"/>
+              </a:xfrm>
+              <a:prstGeom prst="bentConnector3">
+                <a:avLst>
+                  <a:gd name="adj1" fmla="val 1633199"/>
+                </a:avLst>
+              </a:prstGeom>
+              <a:ln w="38100">
+                <a:solidFill>
+                  <a:schemeClr val="bg1"/>
+                </a:solidFill>
+                <a:headEnd type="none" w="med" len="med"/>
+                <a:tailEnd type="arrow" w="med" len="med"/>
+              </a:ln>
+            </p:spPr>
+            <p:style>
+              <a:lnRef idx="1">
+                <a:schemeClr val="accent1"/>
+              </a:lnRef>
+              <a:fillRef idx="0">
+                <a:schemeClr val="accent1"/>
+              </a:fillRef>
+              <a:effectRef idx="0">
+                <a:schemeClr val="accent1"/>
+              </a:effectRef>
+              <a:fontRef idx="minor">
+                <a:schemeClr val="tx1"/>
+              </a:fontRef>
+            </p:style>
+          </p:cxnSp>
+        </p:grpSp>
+        <p:sp>
+          <p:nvSpPr>
+            <p:cNvPr id="56" name="TextBox 55"/>
+            <p:cNvSpPr txBox="1"/>
+            <p:nvPr/>
+          </p:nvSpPr>
+          <p:spPr>
+            <a:xfrm>
+              <a:off x="425215" y="2236380"/>
+              <a:ext cx="1970493" cy="2031325"/>
+            </a:xfrm>
+            <a:prstGeom prst="rect">
+              <a:avLst/>
+            </a:prstGeom>
+            <a:noFill/>
+          </p:spPr>
+          <p:txBody>
+            <a:bodyPr wrap="square" rtlCol="0">
+              <a:spAutoFit/>
+            </a:bodyPr>
+            <a:lstStyle/>
+            <a:p>
+              <a:r>
+                <a:rPr lang="en-US" sz="1400" b="1" dirty="0">
+                  <a:solidFill>
+                    <a:srgbClr val="FF0000"/>
+                  </a:solidFill>
+                </a:rPr>
+                <a:t>2) </a:t>
+              </a:r>
+              <a:r>
+                <a:rPr lang="en-US" sz="1400" dirty="0">
+                  <a:solidFill>
+                    <a:schemeClr val="bg1"/>
+                  </a:solidFill>
+                </a:rPr>
+                <a:t>The state manager alerts the service of the update to the input queue. That update is pushed to all subscription queues and removed from the input queue (using a single transaction).  </a:t>
+              </a:r>
+            </a:p>
+          </p:txBody>
+        </p:sp>
+      </p:grpSp>
+      <p:sp>
+        <p:nvSpPr>
+          <p:cNvPr id="59" name="TextBox 58"/>
+          <p:cNvSpPr txBox="1"/>
+          <p:nvPr/>
+        </p:nvSpPr>
+        <p:spPr>
+          <a:xfrm>
+            <a:off x="7548767" y="3762260"/>
+            <a:ext cx="3925959" cy="1569660"/>
+          </a:xfrm>
+          <a:prstGeom prst="rect">
+            <a:avLst/>
+          </a:prstGeom>
+          <a:noFill/>
+        </p:spPr>
+        <p:txBody>
+          <a:bodyPr wrap="square" rtlCol="0">
+            <a:spAutoFit/>
+          </a:bodyPr>
+          <a:lstStyle/>
+          <a:p>
+            <a:r>
+              <a:rPr lang="en-US" sz="1200" b="1" dirty="0">
+                <a:solidFill>
+                  <a:srgbClr val="FF0000"/>
+                </a:solidFill>
+              </a:rPr>
+              <a:t>3) </a:t>
+            </a:r>
+            <a:r>
+              <a:rPr lang="en-US" sz="1200" dirty="0"/>
+              <a:t>The subscriber service requests a “peek” on its subscription queue to get a copy of the top message. </a:t>
+            </a:r>
+          </a:p>
+          <a:p>
+            <a:endParaRPr lang="en-US" sz="1200" dirty="0"/>
+          </a:p>
+          <a:p>
+            <a:r>
+              <a:rPr lang="en-US" sz="1200" b="1" dirty="0">
+                <a:solidFill>
+                  <a:srgbClr val="FF0000"/>
+                </a:solidFill>
+              </a:rPr>
+              <a:t>4)</a:t>
+            </a:r>
+            <a:r>
+              <a:rPr lang="en-US" sz="1200" dirty="0"/>
+              <a:t> The new message is added to the output queue. </a:t>
+            </a:r>
+          </a:p>
+          <a:p>
+            <a:endParaRPr lang="en-US" sz="1200" dirty="0"/>
+          </a:p>
+          <a:p>
+            <a:r>
+              <a:rPr lang="en-US" sz="1200" b="1" dirty="0">
+                <a:solidFill>
+                  <a:srgbClr val="FF0000"/>
+                </a:solidFill>
+              </a:rPr>
+              <a:t>5) </a:t>
+            </a:r>
+            <a:r>
+              <a:rPr lang="en-US" sz="1200" dirty="0"/>
+              <a:t>The subscriber service requests a “dequeue” on its subscription queue to remove the top message (which is the same as the most recent one that we peeked at).  </a:t>
+            </a:r>
+          </a:p>
+        </p:txBody>
+      </p:sp>
+      <p:sp>
+        <p:nvSpPr>
+          <p:cNvPr id="60" name="TextBox 59"/>
+          <p:cNvSpPr txBox="1"/>
+          <p:nvPr/>
+        </p:nvSpPr>
+        <p:spPr>
+          <a:xfrm>
+            <a:off x="274953" y="4448990"/>
+            <a:ext cx="4923212" cy="2031325"/>
+          </a:xfrm>
+          <a:prstGeom prst="rect">
+            <a:avLst/>
+          </a:prstGeom>
+          <a:noFill/>
+        </p:spPr>
+        <p:txBody>
+          <a:bodyPr wrap="square" rtlCol="0">
+            <a:spAutoFit/>
+          </a:bodyPr>
+          <a:lstStyle/>
+          <a:p>
+            <a:r>
+              <a:rPr lang="en-US" sz="1400" dirty="0"/>
+              <a:t>The topic service maintains a input queue, a dictionary (meta data on all subscription queue objects), and a subscription queue for each subscriber. There is a one to one relationship between the subscriber services and subscription queues. </a:t>
+            </a:r>
+          </a:p>
+          <a:p>
+            <a:endParaRPr lang="en-US" sz="1400" dirty="0"/>
+          </a:p>
+          <a:p>
+            <a:r>
+              <a:rPr lang="en-US" sz="1400" dirty="0"/>
+              <a:t>This approach helps limit the risk of data loss since the replication of input events across subscribers occurs within a single transaction. However, it means that the topic service will have a finite scalability. </a:t>
+            </a:r>
+          </a:p>
+        </p:txBody>
+      </p:sp>
+      <p:sp>
+        <p:nvSpPr>
+          <p:cNvPr id="63" name="TextBox 62"/>
+          <p:cNvSpPr txBox="1"/>
+          <p:nvPr/>
+        </p:nvSpPr>
+        <p:spPr>
+          <a:xfrm>
+            <a:off x="6849987" y="5542238"/>
+            <a:ext cx="5166421" cy="1169551"/>
+          </a:xfrm>
+          <a:prstGeom prst="rect">
+            <a:avLst/>
+          </a:prstGeom>
+          <a:noFill/>
+        </p:spPr>
+        <p:txBody>
+          <a:bodyPr wrap="square" rtlCol="0">
+            <a:spAutoFit/>
+          </a:bodyPr>
+          <a:lstStyle/>
+          <a:p>
+            <a:r>
+              <a:rPr lang="en-US" sz="1400" dirty="0"/>
+              <a:t>The subscriber service is responsible for any “additional” processing on the messages it receives (filtering, visibility timeouts, max read attempts, etc.). This ensures that the complexity of those operations doesn’t place additional load on the topic service (which should just be handling replication). </a:t>
+            </a:r>
+          </a:p>
+        </p:txBody>
+      </p:sp>
+    </p:spTree>
+    <p:extLst>
+      <p:ext uri="{BB962C8B-B14F-4D97-AF65-F5344CB8AC3E}">
+        <p14:creationId xmlns:p14="http://schemas.microsoft.com/office/powerpoint/2010/main" val="2973676182"/>
+      </p:ext>
+    </p:extLst>
+  </p:cSld>
+  <p:clrMapOvr>
+    <a:masterClrMapping/>
+  </p:clrMapOvr>
+</p:sld>
+</file>
+
+<file path=ppt/slides/slide4.xml><?xml version="1.0" encoding="utf-8"?>
 <p:sld xmlns:a="http://schemas.openxmlformats.org/drawingml/2006/main" xmlns:r="http://schemas.openxmlformats.org/officeDocument/2006/relationships" xmlns:p="http://schemas.openxmlformats.org/presentationml/2006/main">
   <p:cSld>
     <p:spTree>

</xml_diff>